<commit_message>
Begin editing ppt before syncing new changes down
</commit_message>
<xml_diff>
--- a/smallAnimation.pptx
+++ b/smallAnimation.pptx
@@ -6,17 +6,18 @@
   </p:sldMasterIdLst>
   <p:sldIdLst>
     <p:sldId id="256" r:id="rId2"/>
-    <p:sldId id="257" r:id="rId3"/>
-    <p:sldId id="263" r:id="rId4"/>
-    <p:sldId id="258" r:id="rId5"/>
-    <p:sldId id="264" r:id="rId6"/>
-    <p:sldId id="259" r:id="rId7"/>
-    <p:sldId id="265" r:id="rId8"/>
-    <p:sldId id="260" r:id="rId9"/>
-    <p:sldId id="266" r:id="rId10"/>
-    <p:sldId id="261" r:id="rId11"/>
-    <p:sldId id="267" r:id="rId12"/>
-    <p:sldId id="262" r:id="rId13"/>
+    <p:sldId id="268" r:id="rId3"/>
+    <p:sldId id="257" r:id="rId4"/>
+    <p:sldId id="263" r:id="rId5"/>
+    <p:sldId id="258" r:id="rId6"/>
+    <p:sldId id="264" r:id="rId7"/>
+    <p:sldId id="259" r:id="rId8"/>
+    <p:sldId id="265" r:id="rId9"/>
+    <p:sldId id="260" r:id="rId10"/>
+    <p:sldId id="266" r:id="rId11"/>
+    <p:sldId id="261" r:id="rId12"/>
+    <p:sldId id="267" r:id="rId13"/>
+    <p:sldId id="262" r:id="rId14"/>
   </p:sldIdLst>
   <p:sldSz cx="12192000" cy="6858000"/>
   <p:notesSz cx="6858000" cy="9144000"/>
@@ -115,6 +116,11 @@
       </a:defRPr>
     </a:lvl9pPr>
   </p:defaultTextStyle>
+  <p:extLst>
+    <p:ext uri="{EFAFB233-063F-42B5-8137-9DF3F51BA10A}">
+      <p15:sldGuideLst xmlns:p15="http://schemas.microsoft.com/office/powerpoint/2012/main"/>
+    </p:ext>
+  </p:extLst>
 </p:presentation>
 </file>
 
@@ -249,7 +255,7 @@
           <a:p>
             <a:fld id="{898FE0C3-8F77-45B6-B8B8-3CA0B302C619}" type="datetimeFigureOut">
               <a:rPr lang="en-US" smtClean="0"/>
-              <a:t>12/7/2014</a:t>
+              <a:t>12/10/2014</a:t>
             </a:fld>
             <a:endParaRPr lang="en-US"/>
           </a:p>
@@ -419,7 +425,7 @@
           <a:p>
             <a:fld id="{898FE0C3-8F77-45B6-B8B8-3CA0B302C619}" type="datetimeFigureOut">
               <a:rPr lang="en-US" smtClean="0"/>
-              <a:t>12/7/2014</a:t>
+              <a:t>12/10/2014</a:t>
             </a:fld>
             <a:endParaRPr lang="en-US"/>
           </a:p>
@@ -599,7 +605,7 @@
           <a:p>
             <a:fld id="{898FE0C3-8F77-45B6-B8B8-3CA0B302C619}" type="datetimeFigureOut">
               <a:rPr lang="en-US" smtClean="0"/>
-              <a:t>12/7/2014</a:t>
+              <a:t>12/10/2014</a:t>
             </a:fld>
             <a:endParaRPr lang="en-US"/>
           </a:p>
@@ -769,7 +775,7 @@
           <a:p>
             <a:fld id="{898FE0C3-8F77-45B6-B8B8-3CA0B302C619}" type="datetimeFigureOut">
               <a:rPr lang="en-US" smtClean="0"/>
-              <a:t>12/7/2014</a:t>
+              <a:t>12/10/2014</a:t>
             </a:fld>
             <a:endParaRPr lang="en-US"/>
           </a:p>
@@ -1015,7 +1021,7 @@
           <a:p>
             <a:fld id="{898FE0C3-8F77-45B6-B8B8-3CA0B302C619}" type="datetimeFigureOut">
               <a:rPr lang="en-US" smtClean="0"/>
-              <a:t>12/7/2014</a:t>
+              <a:t>12/10/2014</a:t>
             </a:fld>
             <a:endParaRPr lang="en-US"/>
           </a:p>
@@ -1247,7 +1253,7 @@
           <a:p>
             <a:fld id="{898FE0C3-8F77-45B6-B8B8-3CA0B302C619}" type="datetimeFigureOut">
               <a:rPr lang="en-US" smtClean="0"/>
-              <a:t>12/7/2014</a:t>
+              <a:t>12/10/2014</a:t>
             </a:fld>
             <a:endParaRPr lang="en-US"/>
           </a:p>
@@ -1614,7 +1620,7 @@
           <a:p>
             <a:fld id="{898FE0C3-8F77-45B6-B8B8-3CA0B302C619}" type="datetimeFigureOut">
               <a:rPr lang="en-US" smtClean="0"/>
-              <a:t>12/7/2014</a:t>
+              <a:t>12/10/2014</a:t>
             </a:fld>
             <a:endParaRPr lang="en-US"/>
           </a:p>
@@ -1732,7 +1738,7 @@
           <a:p>
             <a:fld id="{898FE0C3-8F77-45B6-B8B8-3CA0B302C619}" type="datetimeFigureOut">
               <a:rPr lang="en-US" smtClean="0"/>
-              <a:t>12/7/2014</a:t>
+              <a:t>12/10/2014</a:t>
             </a:fld>
             <a:endParaRPr lang="en-US"/>
           </a:p>
@@ -1827,7 +1833,7 @@
           <a:p>
             <a:fld id="{898FE0C3-8F77-45B6-B8B8-3CA0B302C619}" type="datetimeFigureOut">
               <a:rPr lang="en-US" smtClean="0"/>
-              <a:t>12/7/2014</a:t>
+              <a:t>12/10/2014</a:t>
             </a:fld>
             <a:endParaRPr lang="en-US"/>
           </a:p>
@@ -2104,7 +2110,7 @@
           <a:p>
             <a:fld id="{898FE0C3-8F77-45B6-B8B8-3CA0B302C619}" type="datetimeFigureOut">
               <a:rPr lang="en-US" smtClean="0"/>
-              <a:t>12/7/2014</a:t>
+              <a:t>12/10/2014</a:t>
             </a:fld>
             <a:endParaRPr lang="en-US"/>
           </a:p>
@@ -2357,7 +2363,7 @@
           <a:p>
             <a:fld id="{898FE0C3-8F77-45B6-B8B8-3CA0B302C619}" type="datetimeFigureOut">
               <a:rPr lang="en-US" smtClean="0"/>
-              <a:t>12/7/2014</a:t>
+              <a:t>12/10/2014</a:t>
             </a:fld>
             <a:endParaRPr lang="en-US"/>
           </a:p>
@@ -2570,7 +2576,7 @@
           <a:p>
             <a:fld id="{898FE0C3-8F77-45B6-B8B8-3CA0B302C619}" type="datetimeFigureOut">
               <a:rPr lang="en-US" smtClean="0"/>
-              <a:t>12/7/2014</a:t>
+              <a:t>12/10/2014</a:t>
             </a:fld>
             <a:endParaRPr lang="en-US"/>
           </a:p>
@@ -2990,7 +2996,11 @@
           <a:bodyPr/>
           <a:lstStyle/>
           <a:p>
-            <a:endParaRPr lang="en-US"/>
+            <a:r>
+              <a:rPr lang="en-US" dirty="0" smtClean="0"/>
+              <a:t>MCP+2-opt</a:t>
+            </a:r>
+            <a:endParaRPr lang="en-US" dirty="0"/>
           </a:p>
         </p:txBody>
       </p:sp>
@@ -3009,7 +3019,11 @@
           <a:bodyPr/>
           <a:lstStyle/>
           <a:p>
-            <a:endParaRPr lang="en-US"/>
+            <a:r>
+              <a:rPr lang="en-US" dirty="0" smtClean="0"/>
+              <a:t>Monte-Carlo “Popularity” with 2-opt</a:t>
+            </a:r>
+            <a:endParaRPr lang="en-US" dirty="0"/>
           </a:p>
         </p:txBody>
       </p:sp>
@@ -3027,6 +3041,230 @@
 </file>
 
 <file path=ppt/slides/slide10.xml><?xml version="1.0" encoding="utf-8"?>
+<p:sld xmlns:a="http://schemas.openxmlformats.org/drawingml/2006/main" xmlns:r="http://schemas.openxmlformats.org/officeDocument/2006/relationships" xmlns:p="http://schemas.openxmlformats.org/presentationml/2006/main">
+  <p:cSld>
+    <p:spTree>
+      <p:nvGrpSpPr>
+        <p:cNvPr id="1" name=""/>
+        <p:cNvGrpSpPr/>
+        <p:nvPr/>
+      </p:nvGrpSpPr>
+      <p:grpSpPr>
+        <a:xfrm>
+          <a:off x="0" y="0"/>
+          <a:ext cx="0" cy="0"/>
+          <a:chOff x="0" y="0"/>
+          <a:chExt cx="0" cy="0"/>
+        </a:xfrm>
+      </p:grpSpPr>
+      <p:pic>
+        <p:nvPicPr>
+          <p:cNvPr id="4" name="Picture 3"/>
+          <p:cNvPicPr>
+            <a:picLocks noChangeAspect="1"/>
+          </p:cNvPicPr>
+          <p:nvPr/>
+        </p:nvPicPr>
+        <p:blipFill>
+          <a:blip r:embed="rId2">
+            <a:extLst>
+              <a:ext uri="{28A0092B-C50C-407E-A947-70E740481C1C}">
+                <a14:useLocalDpi xmlns:a14="http://schemas.microsoft.com/office/drawing/2010/main" val="0"/>
+              </a:ext>
+            </a:extLst>
+          </a:blip>
+          <a:stretch>
+            <a:fillRect/>
+          </a:stretch>
+        </p:blipFill>
+        <p:spPr>
+          <a:xfrm>
+            <a:off x="0" y="0"/>
+            <a:ext cx="4572001" cy="6858000"/>
+          </a:xfrm>
+          <a:prstGeom prst="rect">
+            <a:avLst/>
+          </a:prstGeom>
+        </p:spPr>
+      </p:pic>
+      <p:sp>
+        <p:nvSpPr>
+          <p:cNvPr id="5" name="TextBox 4"/>
+          <p:cNvSpPr txBox="1"/>
+          <p:nvPr/>
+        </p:nvSpPr>
+        <p:spPr>
+          <a:xfrm>
+            <a:off x="4572001" y="991674"/>
+            <a:ext cx="5009882" cy="923330"/>
+          </a:xfrm>
+          <a:prstGeom prst="rect">
+            <a:avLst/>
+          </a:prstGeom>
+          <a:noFill/>
+        </p:spPr>
+        <p:txBody>
+          <a:bodyPr wrap="square" rtlCol="0">
+            <a:spAutoFit/>
+          </a:bodyPr>
+          <a:lstStyle/>
+          <a:p>
+            <a:r>
+              <a:rPr lang="en-US" sz="5400" b="1" dirty="0" smtClean="0">
+                <a:latin typeface="Courier New" panose="02070309020205020404" pitchFamily="49" charset="0"/>
+                <a:cs typeface="Courier New" panose="02070309020205020404" pitchFamily="49" charset="0"/>
+              </a:rPr>
+              <a:t>A C D E F B</a:t>
+            </a:r>
+            <a:endParaRPr lang="en-US" sz="5400" b="1" dirty="0">
+              <a:latin typeface="Courier New" panose="02070309020205020404" pitchFamily="49" charset="0"/>
+              <a:cs typeface="Courier New" panose="02070309020205020404" pitchFamily="49" charset="0"/>
+            </a:endParaRPr>
+          </a:p>
+        </p:txBody>
+      </p:sp>
+      <p:sp>
+        <p:nvSpPr>
+          <p:cNvPr id="7" name="TextBox 6"/>
+          <p:cNvSpPr txBox="1"/>
+          <p:nvPr/>
+        </p:nvSpPr>
+        <p:spPr>
+          <a:xfrm>
+            <a:off x="10906261" y="991674"/>
+            <a:ext cx="1071092" cy="923330"/>
+          </a:xfrm>
+          <a:prstGeom prst="rect">
+            <a:avLst/>
+          </a:prstGeom>
+          <a:noFill/>
+        </p:spPr>
+        <p:txBody>
+          <a:bodyPr wrap="square" rtlCol="0">
+            <a:spAutoFit/>
+          </a:bodyPr>
+          <a:lstStyle/>
+          <a:p>
+            <a:r>
+              <a:rPr lang="en-US" sz="5400" b="1" dirty="0" smtClean="0">
+                <a:latin typeface="Courier New" panose="02070309020205020404" pitchFamily="49" charset="0"/>
+                <a:cs typeface="Courier New" panose="02070309020205020404" pitchFamily="49" charset="0"/>
+              </a:rPr>
+              <a:t>12</a:t>
+            </a:r>
+            <a:endParaRPr lang="en-US" sz="5400" b="1" dirty="0">
+              <a:latin typeface="Courier New" panose="02070309020205020404" pitchFamily="49" charset="0"/>
+              <a:cs typeface="Courier New" panose="02070309020205020404" pitchFamily="49" charset="0"/>
+            </a:endParaRPr>
+          </a:p>
+        </p:txBody>
+      </p:sp>
+      <p:sp>
+        <p:nvSpPr>
+          <p:cNvPr id="6" name="Rounded Rectangle 5"/>
+          <p:cNvSpPr/>
+          <p:nvPr/>
+        </p:nvSpPr>
+        <p:spPr>
+          <a:xfrm>
+            <a:off x="5228823" y="991674"/>
+            <a:ext cx="927279" cy="923330"/>
+          </a:xfrm>
+          <a:prstGeom prst="roundRect">
+            <a:avLst/>
+          </a:prstGeom>
+          <a:noFill/>
+          <a:ln>
+            <a:solidFill>
+              <a:srgbClr val="FF0000"/>
+            </a:solidFill>
+          </a:ln>
+        </p:spPr>
+        <p:style>
+          <a:lnRef idx="2">
+            <a:schemeClr val="accent6"/>
+          </a:lnRef>
+          <a:fillRef idx="1">
+            <a:schemeClr val="lt1"/>
+          </a:fillRef>
+          <a:effectRef idx="0">
+            <a:schemeClr val="accent6"/>
+          </a:effectRef>
+          <a:fontRef idx="minor">
+            <a:schemeClr val="dk1"/>
+          </a:fontRef>
+        </p:style>
+        <p:txBody>
+          <a:bodyPr rtlCol="0" anchor="ctr"/>
+          <a:lstStyle/>
+          <a:p>
+            <a:pPr algn="ctr"/>
+            <a:endParaRPr lang="en-US"/>
+          </a:p>
+        </p:txBody>
+      </p:sp>
+      <p:sp>
+        <p:nvSpPr>
+          <p:cNvPr id="8" name="Rounded Rectangle 7"/>
+          <p:cNvSpPr/>
+          <p:nvPr/>
+        </p:nvSpPr>
+        <p:spPr>
+          <a:xfrm>
+            <a:off x="7688688" y="991674"/>
+            <a:ext cx="927279" cy="923330"/>
+          </a:xfrm>
+          <a:prstGeom prst="roundRect">
+            <a:avLst/>
+          </a:prstGeom>
+          <a:noFill/>
+          <a:ln>
+            <a:solidFill>
+              <a:schemeClr val="accent1"/>
+            </a:solidFill>
+          </a:ln>
+        </p:spPr>
+        <p:style>
+          <a:lnRef idx="2">
+            <a:schemeClr val="accent6"/>
+          </a:lnRef>
+          <a:fillRef idx="1">
+            <a:schemeClr val="lt1"/>
+          </a:fillRef>
+          <a:effectRef idx="0">
+            <a:schemeClr val="accent6"/>
+          </a:effectRef>
+          <a:fontRef idx="minor">
+            <a:schemeClr val="dk1"/>
+          </a:fontRef>
+        </p:style>
+        <p:txBody>
+          <a:bodyPr rtlCol="0" anchor="ctr"/>
+          <a:lstStyle/>
+          <a:p>
+            <a:pPr algn="ctr"/>
+            <a:endParaRPr lang="en-US">
+              <a:solidFill>
+                <a:srgbClr val="0070C0"/>
+              </a:solidFill>
+            </a:endParaRPr>
+          </a:p>
+        </p:txBody>
+      </p:sp>
+    </p:spTree>
+    <p:extLst>
+      <p:ext uri="{BB962C8B-B14F-4D97-AF65-F5344CB8AC3E}">
+        <p14:creationId xmlns:p14="http://schemas.microsoft.com/office/powerpoint/2010/main" val="1490565954"/>
+      </p:ext>
+    </p:extLst>
+  </p:cSld>
+  <p:clrMapOvr>
+    <a:masterClrMapping/>
+  </p:clrMapOvr>
+</p:sld>
+</file>
+
+<file path=ppt/slides/slide11.xml><?xml version="1.0" encoding="utf-8"?>
 <p:sld xmlns:a="http://schemas.openxmlformats.org/drawingml/2006/main" xmlns:r="http://schemas.openxmlformats.org/officeDocument/2006/relationships" xmlns:p="http://schemas.openxmlformats.org/presentationml/2006/main">
   <p:cSld>
     <p:spTree>
@@ -3250,7 +3488,7 @@
 </p:sld>
 </file>
 
-<file path=ppt/slides/slide11.xml><?xml version="1.0" encoding="utf-8"?>
+<file path=ppt/slides/slide12.xml><?xml version="1.0" encoding="utf-8"?>
 <p:sld xmlns:a="http://schemas.openxmlformats.org/drawingml/2006/main" xmlns:r="http://schemas.openxmlformats.org/officeDocument/2006/relationships" xmlns:p="http://schemas.openxmlformats.org/presentationml/2006/main">
   <p:cSld>
     <p:spTree>
@@ -3474,7 +3712,7 @@
 </p:sld>
 </file>
 
-<file path=ppt/slides/slide12.xml><?xml version="1.0" encoding="utf-8"?>
+<file path=ppt/slides/slide13.xml><?xml version="1.0" encoding="utf-8"?>
 <p:sld xmlns:a="http://schemas.openxmlformats.org/drawingml/2006/main" xmlns:r="http://schemas.openxmlformats.org/officeDocument/2006/relationships" xmlns:p="http://schemas.openxmlformats.org/presentationml/2006/main">
   <p:cSld>
     <p:spTree>
@@ -3715,112 +3953,48 @@
           <a:chExt cx="0" cy="0"/>
         </a:xfrm>
       </p:grpSpPr>
-      <p:pic>
-        <p:nvPicPr>
-          <p:cNvPr id="4" name="Picture 3"/>
-          <p:cNvPicPr>
-            <a:picLocks noChangeAspect="1"/>
-          </p:cNvPicPr>
-          <p:nvPr/>
-        </p:nvPicPr>
-        <p:blipFill>
-          <a:blip r:embed="rId2">
-            <a:extLst>
-              <a:ext uri="{28A0092B-C50C-407E-A947-70E740481C1C}">
-                <a14:useLocalDpi xmlns:a14="http://schemas.microsoft.com/office/drawing/2010/main" val="0"/>
-              </a:ext>
-            </a:extLst>
-          </a:blip>
-          <a:stretch>
-            <a:fillRect/>
-          </a:stretch>
-        </p:blipFill>
-        <p:spPr>
-          <a:xfrm>
-            <a:off x="0" y="0"/>
-            <a:ext cx="4572001" cy="6858000"/>
-          </a:xfrm>
-          <a:prstGeom prst="rect">
-            <a:avLst/>
-          </a:prstGeom>
-        </p:spPr>
-      </p:pic>
-      <p:sp>
-        <p:nvSpPr>
-          <p:cNvPr id="5" name="TextBox 4"/>
-          <p:cNvSpPr txBox="1"/>
-          <p:nvPr/>
-        </p:nvSpPr>
-        <p:spPr>
-          <a:xfrm>
-            <a:off x="4572001" y="991674"/>
-            <a:ext cx="5009882" cy="923330"/>
-          </a:xfrm>
-          <a:prstGeom prst="rect">
-            <a:avLst/>
-          </a:prstGeom>
-          <a:noFill/>
-        </p:spPr>
-        <p:txBody>
-          <a:bodyPr wrap="square" rtlCol="0">
-            <a:spAutoFit/>
-          </a:bodyPr>
-          <a:lstStyle/>
-          <a:p>
-            <a:r>
-              <a:rPr lang="en-US" sz="5400" b="1" dirty="0" smtClean="0">
-                <a:latin typeface="Courier New" panose="02070309020205020404" pitchFamily="49" charset="0"/>
-                <a:cs typeface="Courier New" panose="02070309020205020404" pitchFamily="49" charset="0"/>
-              </a:rPr>
-              <a:t>A C D E F B</a:t>
-            </a:r>
-            <a:endParaRPr lang="en-US" sz="5400" b="1" dirty="0">
-              <a:latin typeface="Courier New" panose="02070309020205020404" pitchFamily="49" charset="0"/>
-              <a:cs typeface="Courier New" panose="02070309020205020404" pitchFamily="49" charset="0"/>
-            </a:endParaRPr>
-          </a:p>
-        </p:txBody>
-      </p:sp>
-      <p:sp>
-        <p:nvSpPr>
-          <p:cNvPr id="7" name="TextBox 6"/>
-          <p:cNvSpPr txBox="1"/>
-          <p:nvPr/>
-        </p:nvSpPr>
-        <p:spPr>
-          <a:xfrm>
-            <a:off x="10906261" y="991674"/>
-            <a:ext cx="1071092" cy="923330"/>
-          </a:xfrm>
-          <a:prstGeom prst="rect">
-            <a:avLst/>
-          </a:prstGeom>
-          <a:noFill/>
-        </p:spPr>
-        <p:txBody>
-          <a:bodyPr wrap="square" rtlCol="0">
-            <a:spAutoFit/>
-          </a:bodyPr>
-          <a:lstStyle/>
-          <a:p>
-            <a:r>
-              <a:rPr lang="en-US" sz="5400" b="1" dirty="0" smtClean="0">
-                <a:latin typeface="Courier New" panose="02070309020205020404" pitchFamily="49" charset="0"/>
-                <a:cs typeface="Courier New" panose="02070309020205020404" pitchFamily="49" charset="0"/>
-              </a:rPr>
-              <a:t>12</a:t>
-            </a:r>
-            <a:endParaRPr lang="en-US" sz="5400" b="1" dirty="0">
-              <a:latin typeface="Courier New" panose="02070309020205020404" pitchFamily="49" charset="0"/>
-              <a:cs typeface="Courier New" panose="02070309020205020404" pitchFamily="49" charset="0"/>
-            </a:endParaRPr>
+      <p:sp>
+        <p:nvSpPr>
+          <p:cNvPr id="2" name="Title 1"/>
+          <p:cNvSpPr>
+            <a:spLocks noGrp="1"/>
+          </p:cNvSpPr>
+          <p:nvPr>
+            <p:ph type="title"/>
+          </p:nvPr>
+        </p:nvSpPr>
+        <p:spPr/>
+        <p:txBody>
+          <a:bodyPr/>
+          <a:lstStyle/>
+          <a:p>
+            <a:endParaRPr lang="en-US"/>
+          </a:p>
+        </p:txBody>
+      </p:sp>
+      <p:sp>
+        <p:nvSpPr>
+          <p:cNvPr id="3" name="Content Placeholder 2"/>
+          <p:cNvSpPr>
+            <a:spLocks noGrp="1"/>
+          </p:cNvSpPr>
+          <p:nvPr>
+            <p:ph idx="1"/>
+          </p:nvPr>
+        </p:nvSpPr>
+        <p:spPr/>
+        <p:txBody>
+          <a:bodyPr/>
+          <a:lstStyle/>
+          <a:p>
+            <a:endParaRPr lang="en-US"/>
           </a:p>
         </p:txBody>
       </p:sp>
     </p:spTree>
     <p:extLst>
       <p:ext uri="{BB962C8B-B14F-4D97-AF65-F5344CB8AC3E}">
-        <p14:creationId xmlns:p14="http://schemas.microsoft.com/office/powerpoint/2010/main" val="3800994665"/>
+        <p14:creationId xmlns:p14="http://schemas.microsoft.com/office/powerpoint/2010/main" val="3759121014"/>
       </p:ext>
     </p:extLst>
   </p:cSld>
@@ -3949,6 +4123,138 @@
           </a:p>
         </p:txBody>
       </p:sp>
+    </p:spTree>
+    <p:extLst>
+      <p:ext uri="{BB962C8B-B14F-4D97-AF65-F5344CB8AC3E}">
+        <p14:creationId xmlns:p14="http://schemas.microsoft.com/office/powerpoint/2010/main" val="3800994665"/>
+      </p:ext>
+    </p:extLst>
+  </p:cSld>
+  <p:clrMapOvr>
+    <a:masterClrMapping/>
+  </p:clrMapOvr>
+</p:sld>
+</file>
+
+<file path=ppt/slides/slide4.xml><?xml version="1.0" encoding="utf-8"?>
+<p:sld xmlns:a="http://schemas.openxmlformats.org/drawingml/2006/main" xmlns:r="http://schemas.openxmlformats.org/officeDocument/2006/relationships" xmlns:p="http://schemas.openxmlformats.org/presentationml/2006/main">
+  <p:cSld>
+    <p:spTree>
+      <p:nvGrpSpPr>
+        <p:cNvPr id="1" name=""/>
+        <p:cNvGrpSpPr/>
+        <p:nvPr/>
+      </p:nvGrpSpPr>
+      <p:grpSpPr>
+        <a:xfrm>
+          <a:off x="0" y="0"/>
+          <a:ext cx="0" cy="0"/>
+          <a:chOff x="0" y="0"/>
+          <a:chExt cx="0" cy="0"/>
+        </a:xfrm>
+      </p:grpSpPr>
+      <p:pic>
+        <p:nvPicPr>
+          <p:cNvPr id="4" name="Picture 3"/>
+          <p:cNvPicPr>
+            <a:picLocks noChangeAspect="1"/>
+          </p:cNvPicPr>
+          <p:nvPr/>
+        </p:nvPicPr>
+        <p:blipFill>
+          <a:blip r:embed="rId2">
+            <a:extLst>
+              <a:ext uri="{28A0092B-C50C-407E-A947-70E740481C1C}">
+                <a14:useLocalDpi xmlns:a14="http://schemas.microsoft.com/office/drawing/2010/main" val="0"/>
+              </a:ext>
+            </a:extLst>
+          </a:blip>
+          <a:stretch>
+            <a:fillRect/>
+          </a:stretch>
+        </p:blipFill>
+        <p:spPr>
+          <a:xfrm>
+            <a:off x="0" y="0"/>
+            <a:ext cx="4572001" cy="6858000"/>
+          </a:xfrm>
+          <a:prstGeom prst="rect">
+            <a:avLst/>
+          </a:prstGeom>
+        </p:spPr>
+      </p:pic>
+      <p:sp>
+        <p:nvSpPr>
+          <p:cNvPr id="5" name="TextBox 4"/>
+          <p:cNvSpPr txBox="1"/>
+          <p:nvPr/>
+        </p:nvSpPr>
+        <p:spPr>
+          <a:xfrm>
+            <a:off x="4572001" y="991674"/>
+            <a:ext cx="5009882" cy="923330"/>
+          </a:xfrm>
+          <a:prstGeom prst="rect">
+            <a:avLst/>
+          </a:prstGeom>
+          <a:noFill/>
+        </p:spPr>
+        <p:txBody>
+          <a:bodyPr wrap="square" rtlCol="0">
+            <a:spAutoFit/>
+          </a:bodyPr>
+          <a:lstStyle/>
+          <a:p>
+            <a:r>
+              <a:rPr lang="en-US" sz="5400" b="1" dirty="0" smtClean="0">
+                <a:latin typeface="Courier New" panose="02070309020205020404" pitchFamily="49" charset="0"/>
+                <a:cs typeface="Courier New" panose="02070309020205020404" pitchFamily="49" charset="0"/>
+              </a:rPr>
+              <a:t>A C D E F B</a:t>
+            </a:r>
+            <a:endParaRPr lang="en-US" sz="5400" b="1" dirty="0">
+              <a:latin typeface="Courier New" panose="02070309020205020404" pitchFamily="49" charset="0"/>
+              <a:cs typeface="Courier New" panose="02070309020205020404" pitchFamily="49" charset="0"/>
+            </a:endParaRPr>
+          </a:p>
+        </p:txBody>
+      </p:sp>
+      <p:sp>
+        <p:nvSpPr>
+          <p:cNvPr id="7" name="TextBox 6"/>
+          <p:cNvSpPr txBox="1"/>
+          <p:nvPr/>
+        </p:nvSpPr>
+        <p:spPr>
+          <a:xfrm>
+            <a:off x="10906261" y="991674"/>
+            <a:ext cx="1071092" cy="923330"/>
+          </a:xfrm>
+          <a:prstGeom prst="rect">
+            <a:avLst/>
+          </a:prstGeom>
+          <a:noFill/>
+        </p:spPr>
+        <p:txBody>
+          <a:bodyPr wrap="square" rtlCol="0">
+            <a:spAutoFit/>
+          </a:bodyPr>
+          <a:lstStyle/>
+          <a:p>
+            <a:r>
+              <a:rPr lang="en-US" sz="5400" b="1" dirty="0" smtClean="0">
+                <a:latin typeface="Courier New" panose="02070309020205020404" pitchFamily="49" charset="0"/>
+                <a:cs typeface="Courier New" panose="02070309020205020404" pitchFamily="49" charset="0"/>
+              </a:rPr>
+              <a:t>12</a:t>
+            </a:r>
+            <a:endParaRPr lang="en-US" sz="5400" b="1" dirty="0">
+              <a:latin typeface="Courier New" panose="02070309020205020404" pitchFamily="49" charset="0"/>
+              <a:cs typeface="Courier New" panose="02070309020205020404" pitchFamily="49" charset="0"/>
+            </a:endParaRPr>
+          </a:p>
+        </p:txBody>
+      </p:sp>
       <p:sp>
         <p:nvSpPr>
           <p:cNvPr id="6" name="Rounded Rectangle 5"/>
@@ -4054,7 +4360,7 @@
 </p:sld>
 </file>
 
-<file path=ppt/slides/slide4.xml><?xml version="1.0" encoding="utf-8"?>
+<file path=ppt/slides/slide5.xml><?xml version="1.0" encoding="utf-8"?>
 <p:sld xmlns:a="http://schemas.openxmlformats.org/drawingml/2006/main" xmlns:r="http://schemas.openxmlformats.org/officeDocument/2006/relationships" xmlns:p="http://schemas.openxmlformats.org/presentationml/2006/main">
   <p:cSld>
     <p:spTree>
@@ -4278,7 +4584,7 @@
 </p:sld>
 </file>
 
-<file path=ppt/slides/slide5.xml><?xml version="1.0" encoding="utf-8"?>
+<file path=ppt/slides/slide6.xml><?xml version="1.0" encoding="utf-8"?>
 <p:sld xmlns:a="http://schemas.openxmlformats.org/drawingml/2006/main" xmlns:r="http://schemas.openxmlformats.org/officeDocument/2006/relationships" xmlns:p="http://schemas.openxmlformats.org/presentationml/2006/main">
   <p:cSld>
     <p:spTree>
@@ -4502,7 +4808,7 @@
 </p:sld>
 </file>
 
-<file path=ppt/slides/slide6.xml><?xml version="1.0" encoding="utf-8"?>
+<file path=ppt/slides/slide7.xml><?xml version="1.0" encoding="utf-8"?>
 <p:sld xmlns:a="http://schemas.openxmlformats.org/drawingml/2006/main" xmlns:r="http://schemas.openxmlformats.org/officeDocument/2006/relationships" xmlns:p="http://schemas.openxmlformats.org/presentationml/2006/main">
   <p:cSld>
     <p:spTree>
@@ -4726,7 +5032,7 @@
 </p:sld>
 </file>
 
-<file path=ppt/slides/slide7.xml><?xml version="1.0" encoding="utf-8"?>
+<file path=ppt/slides/slide8.xml><?xml version="1.0" encoding="utf-8"?>
 <p:sld xmlns:a="http://schemas.openxmlformats.org/drawingml/2006/main" xmlns:r="http://schemas.openxmlformats.org/officeDocument/2006/relationships" xmlns:p="http://schemas.openxmlformats.org/presentationml/2006/main">
   <p:cSld>
     <p:spTree>
@@ -4950,7 +5256,7 @@
 </p:sld>
 </file>
 
-<file path=ppt/slides/slide8.xml><?xml version="1.0" encoding="utf-8"?>
+<file path=ppt/slides/slide9.xml><?xml version="1.0" encoding="utf-8"?>
 <p:sld xmlns:a="http://schemas.openxmlformats.org/drawingml/2006/main" xmlns:r="http://schemas.openxmlformats.org/officeDocument/2006/relationships" xmlns:p="http://schemas.openxmlformats.org/presentationml/2006/main">
   <p:cSld>
     <p:spTree>
@@ -5165,230 +5471,6 @@
     <p:extLst>
       <p:ext uri="{BB962C8B-B14F-4D97-AF65-F5344CB8AC3E}">
         <p14:creationId xmlns:p14="http://schemas.microsoft.com/office/powerpoint/2010/main" val="3783106851"/>
-      </p:ext>
-    </p:extLst>
-  </p:cSld>
-  <p:clrMapOvr>
-    <a:masterClrMapping/>
-  </p:clrMapOvr>
-</p:sld>
-</file>
-
-<file path=ppt/slides/slide9.xml><?xml version="1.0" encoding="utf-8"?>
-<p:sld xmlns:a="http://schemas.openxmlformats.org/drawingml/2006/main" xmlns:r="http://schemas.openxmlformats.org/officeDocument/2006/relationships" xmlns:p="http://schemas.openxmlformats.org/presentationml/2006/main">
-  <p:cSld>
-    <p:spTree>
-      <p:nvGrpSpPr>
-        <p:cNvPr id="1" name=""/>
-        <p:cNvGrpSpPr/>
-        <p:nvPr/>
-      </p:nvGrpSpPr>
-      <p:grpSpPr>
-        <a:xfrm>
-          <a:off x="0" y="0"/>
-          <a:ext cx="0" cy="0"/>
-          <a:chOff x="0" y="0"/>
-          <a:chExt cx="0" cy="0"/>
-        </a:xfrm>
-      </p:grpSpPr>
-      <p:pic>
-        <p:nvPicPr>
-          <p:cNvPr id="4" name="Picture 3"/>
-          <p:cNvPicPr>
-            <a:picLocks noChangeAspect="1"/>
-          </p:cNvPicPr>
-          <p:nvPr/>
-        </p:nvPicPr>
-        <p:blipFill>
-          <a:blip r:embed="rId2">
-            <a:extLst>
-              <a:ext uri="{28A0092B-C50C-407E-A947-70E740481C1C}">
-                <a14:useLocalDpi xmlns:a14="http://schemas.microsoft.com/office/drawing/2010/main" val="0"/>
-              </a:ext>
-            </a:extLst>
-          </a:blip>
-          <a:stretch>
-            <a:fillRect/>
-          </a:stretch>
-        </p:blipFill>
-        <p:spPr>
-          <a:xfrm>
-            <a:off x="0" y="0"/>
-            <a:ext cx="4572001" cy="6858000"/>
-          </a:xfrm>
-          <a:prstGeom prst="rect">
-            <a:avLst/>
-          </a:prstGeom>
-        </p:spPr>
-      </p:pic>
-      <p:sp>
-        <p:nvSpPr>
-          <p:cNvPr id="5" name="TextBox 4"/>
-          <p:cNvSpPr txBox="1"/>
-          <p:nvPr/>
-        </p:nvSpPr>
-        <p:spPr>
-          <a:xfrm>
-            <a:off x="4572001" y="991674"/>
-            <a:ext cx="5009882" cy="923330"/>
-          </a:xfrm>
-          <a:prstGeom prst="rect">
-            <a:avLst/>
-          </a:prstGeom>
-          <a:noFill/>
-        </p:spPr>
-        <p:txBody>
-          <a:bodyPr wrap="square" rtlCol="0">
-            <a:spAutoFit/>
-          </a:bodyPr>
-          <a:lstStyle/>
-          <a:p>
-            <a:r>
-              <a:rPr lang="en-US" sz="5400" b="1" dirty="0" smtClean="0">
-                <a:latin typeface="Courier New" panose="02070309020205020404" pitchFamily="49" charset="0"/>
-                <a:cs typeface="Courier New" panose="02070309020205020404" pitchFamily="49" charset="0"/>
-              </a:rPr>
-              <a:t>A C D E F B</a:t>
-            </a:r>
-            <a:endParaRPr lang="en-US" sz="5400" b="1" dirty="0">
-              <a:latin typeface="Courier New" panose="02070309020205020404" pitchFamily="49" charset="0"/>
-              <a:cs typeface="Courier New" panose="02070309020205020404" pitchFamily="49" charset="0"/>
-            </a:endParaRPr>
-          </a:p>
-        </p:txBody>
-      </p:sp>
-      <p:sp>
-        <p:nvSpPr>
-          <p:cNvPr id="7" name="TextBox 6"/>
-          <p:cNvSpPr txBox="1"/>
-          <p:nvPr/>
-        </p:nvSpPr>
-        <p:spPr>
-          <a:xfrm>
-            <a:off x="10906261" y="991674"/>
-            <a:ext cx="1071092" cy="923330"/>
-          </a:xfrm>
-          <a:prstGeom prst="rect">
-            <a:avLst/>
-          </a:prstGeom>
-          <a:noFill/>
-        </p:spPr>
-        <p:txBody>
-          <a:bodyPr wrap="square" rtlCol="0">
-            <a:spAutoFit/>
-          </a:bodyPr>
-          <a:lstStyle/>
-          <a:p>
-            <a:r>
-              <a:rPr lang="en-US" sz="5400" b="1" dirty="0" smtClean="0">
-                <a:latin typeface="Courier New" panose="02070309020205020404" pitchFamily="49" charset="0"/>
-                <a:cs typeface="Courier New" panose="02070309020205020404" pitchFamily="49" charset="0"/>
-              </a:rPr>
-              <a:t>12</a:t>
-            </a:r>
-            <a:endParaRPr lang="en-US" sz="5400" b="1" dirty="0">
-              <a:latin typeface="Courier New" panose="02070309020205020404" pitchFamily="49" charset="0"/>
-              <a:cs typeface="Courier New" panose="02070309020205020404" pitchFamily="49" charset="0"/>
-            </a:endParaRPr>
-          </a:p>
-        </p:txBody>
-      </p:sp>
-      <p:sp>
-        <p:nvSpPr>
-          <p:cNvPr id="6" name="Rounded Rectangle 5"/>
-          <p:cNvSpPr/>
-          <p:nvPr/>
-        </p:nvSpPr>
-        <p:spPr>
-          <a:xfrm>
-            <a:off x="5228823" y="991674"/>
-            <a:ext cx="927279" cy="923330"/>
-          </a:xfrm>
-          <a:prstGeom prst="roundRect">
-            <a:avLst/>
-          </a:prstGeom>
-          <a:noFill/>
-          <a:ln>
-            <a:solidFill>
-              <a:srgbClr val="FF0000"/>
-            </a:solidFill>
-          </a:ln>
-        </p:spPr>
-        <p:style>
-          <a:lnRef idx="2">
-            <a:schemeClr val="accent6"/>
-          </a:lnRef>
-          <a:fillRef idx="1">
-            <a:schemeClr val="lt1"/>
-          </a:fillRef>
-          <a:effectRef idx="0">
-            <a:schemeClr val="accent6"/>
-          </a:effectRef>
-          <a:fontRef idx="minor">
-            <a:schemeClr val="dk1"/>
-          </a:fontRef>
-        </p:style>
-        <p:txBody>
-          <a:bodyPr rtlCol="0" anchor="ctr"/>
-          <a:lstStyle/>
-          <a:p>
-            <a:pPr algn="ctr"/>
-            <a:endParaRPr lang="en-US"/>
-          </a:p>
-        </p:txBody>
-      </p:sp>
-      <p:sp>
-        <p:nvSpPr>
-          <p:cNvPr id="8" name="Rounded Rectangle 7"/>
-          <p:cNvSpPr/>
-          <p:nvPr/>
-        </p:nvSpPr>
-        <p:spPr>
-          <a:xfrm>
-            <a:off x="7688688" y="991674"/>
-            <a:ext cx="927279" cy="923330"/>
-          </a:xfrm>
-          <a:prstGeom prst="roundRect">
-            <a:avLst/>
-          </a:prstGeom>
-          <a:noFill/>
-          <a:ln>
-            <a:solidFill>
-              <a:schemeClr val="accent1"/>
-            </a:solidFill>
-          </a:ln>
-        </p:spPr>
-        <p:style>
-          <a:lnRef idx="2">
-            <a:schemeClr val="accent6"/>
-          </a:lnRef>
-          <a:fillRef idx="1">
-            <a:schemeClr val="lt1"/>
-          </a:fillRef>
-          <a:effectRef idx="0">
-            <a:schemeClr val="accent6"/>
-          </a:effectRef>
-          <a:fontRef idx="minor">
-            <a:schemeClr val="dk1"/>
-          </a:fontRef>
-        </p:style>
-        <p:txBody>
-          <a:bodyPr rtlCol="0" anchor="ctr"/>
-          <a:lstStyle/>
-          <a:p>
-            <a:pPr algn="ctr"/>
-            <a:endParaRPr lang="en-US">
-              <a:solidFill>
-                <a:srgbClr val="0070C0"/>
-              </a:solidFill>
-            </a:endParaRPr>
-          </a:p>
-        </p:txBody>
-      </p:sp>
-    </p:spTree>
-    <p:extLst>
-      <p:ext uri="{BB962C8B-B14F-4D97-AF65-F5344CB8AC3E}">
-        <p14:creationId xmlns:p14="http://schemas.microsoft.com/office/powerpoint/2010/main" val="1490565954"/>
       </p:ext>
     </p:extLst>
   </p:cSld>

</xml_diff>

<commit_message>
Updated/Renamed Report, Added to Prez
- Report more accurately named (turns out it wasn't a Monte Carlo mod,
it's a local search... so that was awkward...
- Added stats forwarded by Sean to slides
</commit_message>
<xml_diff>
--- a/smallAnimation.pptx
+++ b/smallAnimation.pptx
@@ -13813,7 +13813,7 @@
             <p:ph idx="1"/>
             <p:extLst>
               <p:ext uri="{D42A27DB-BD31-4B8C-83A1-F6EECF244321}">
-                <p14:modId xmlns:p14="http://schemas.microsoft.com/office/powerpoint/2010/main" val="1223080126"/>
+                <p14:modId xmlns:p14="http://schemas.microsoft.com/office/powerpoint/2010/main" val="2658907685"/>
               </p:ext>
             </p:extLst>
           </p:nvPr>
@@ -14786,141 +14786,15 @@
                     <a:p>
                       <a:pPr algn="r" fontAlgn="b"/>
                       <a:r>
-                        <a:rPr lang="en-US" sz="1100" b="0" i="0" u="none" strike="noStrike" dirty="0">
-                          <a:solidFill>
-                            <a:srgbClr val="000000"/>
-                          </a:solidFill>
-                          <a:effectLst/>
-                          <a:latin typeface="Batang" panose="02030600000101010101" pitchFamily="18" charset="-127"/>
-                          <a:ea typeface="Batang" panose="02030600000101010101" pitchFamily="18" charset="-127"/>
-                        </a:rPr>
-                        <a:t>0.2</a:t>
-                      </a:r>
-                    </a:p>
-                  </a:txBody>
-                  <a:tcPr marL="9525" marR="9525" marT="9525" marB="0" anchor="b"/>
-                </a:tc>
-                <a:tc>
-                  <a:txBody>
-                    <a:bodyPr/>
-                    <a:lstStyle/>
-                    <a:p>
-                      <a:pPr algn="r" fontAlgn="b"/>
-                      <a:r>
-                        <a:rPr lang="en-US" sz="1100" b="0" i="0" u="none" strike="noStrike">
-                          <a:solidFill>
-                            <a:srgbClr val="000000"/>
-                          </a:solidFill>
-                          <a:effectLst/>
-                          <a:latin typeface="Batang" panose="02030600000101010101" pitchFamily="18" charset="-127"/>
-                          <a:ea typeface="Batang" panose="02030600000101010101" pitchFamily="18" charset="-127"/>
-                        </a:rPr>
-                        <a:t>37208</a:t>
-                      </a:r>
-                    </a:p>
-                  </a:txBody>
-                  <a:tcPr marL="9525" marR="9525" marT="9525" marB="0" anchor="b"/>
-                </a:tc>
-                <a:tc>
-                  <a:txBody>
-                    <a:bodyPr/>
-                    <a:lstStyle/>
-                    <a:p>
-                      <a:pPr algn="r" fontAlgn="b"/>
-                      <a:r>
-                        <a:rPr lang="en-US" sz="1100" b="0" i="0" u="none" strike="noStrike">
-                          <a:solidFill>
-                            <a:srgbClr val="000000"/>
-                          </a:solidFill>
-                          <a:effectLst/>
-                          <a:latin typeface="Batang" panose="02030600000101010101" pitchFamily="18" charset="-127"/>
-                          <a:ea typeface="Batang" panose="02030600000101010101" pitchFamily="18" charset="-127"/>
-                        </a:rPr>
-                        <a:t>91.54%</a:t>
-                      </a:r>
-                    </a:p>
-                  </a:txBody>
-                  <a:tcPr marL="9525" marR="9525" marT="9525" marB="0" anchor="b"/>
-                </a:tc>
-                <a:tc>
-                  <a:txBody>
-                    <a:bodyPr/>
-                    <a:lstStyle/>
-                    <a:p>
-                      <a:pPr algn="r" fontAlgn="b"/>
-                      <a:r>
-                        <a:rPr lang="en-US" sz="1100" b="0" i="0" u="none" strike="noStrike">
-                          <a:solidFill>
-                            <a:srgbClr val="000000"/>
-                          </a:solidFill>
-                          <a:effectLst/>
-                          <a:latin typeface="Batang" panose="02030600000101010101" pitchFamily="18" charset="-127"/>
-                          <a:ea typeface="Batang" panose="02030600000101010101" pitchFamily="18" charset="-127"/>
-                        </a:rPr>
-                        <a:t>TB</a:t>
-                      </a:r>
-                    </a:p>
-                  </a:txBody>
-                  <a:tcPr marL="9525" marR="9525" marT="9525" marB="0" anchor="b"/>
-                </a:tc>
-                <a:tc>
-                  <a:txBody>
-                    <a:bodyPr/>
-                    <a:lstStyle/>
-                    <a:p>
-                      <a:pPr algn="r" fontAlgn="b"/>
-                      <a:r>
-                        <a:rPr lang="en-US" sz="1100" b="0" i="0" u="none" strike="noStrike">
-                          <a:solidFill>
-                            <a:srgbClr val="000000"/>
-                          </a:solidFill>
-                          <a:effectLst/>
-                          <a:latin typeface="Batang" panose="02030600000101010101" pitchFamily="18" charset="-127"/>
-                          <a:ea typeface="Batang" panose="02030600000101010101" pitchFamily="18" charset="-127"/>
-                        </a:rPr>
-                        <a:t>TB</a:t>
-                      </a:r>
-                    </a:p>
-                  </a:txBody>
-                  <a:tcPr marL="9525" marR="9525" marT="9525" marB="0" anchor="b"/>
-                </a:tc>
-                <a:tc>
-                  <a:txBody>
-                    <a:bodyPr/>
-                    <a:lstStyle/>
-                    <a:p>
-                      <a:pPr algn="r" fontAlgn="b"/>
-                      <a:r>
-                        <a:rPr lang="en-US" sz="1100" b="0" i="0" u="none" strike="noStrike">
-                          <a:solidFill>
-                            <a:srgbClr val="000000"/>
-                          </a:solidFill>
-                          <a:effectLst/>
-                          <a:latin typeface="Batang" panose="02030600000101010101" pitchFamily="18" charset="-127"/>
-                          <a:ea typeface="Batang" panose="02030600000101010101" pitchFamily="18" charset="-127"/>
-                        </a:rPr>
-                        <a:t>TB</a:t>
-                      </a:r>
-                    </a:p>
-                  </a:txBody>
-                  <a:tcPr marL="9525" marR="9525" marT="9525" marB="0" anchor="b"/>
-                </a:tc>
-                <a:tc>
-                  <a:txBody>
-                    <a:bodyPr/>
-                    <a:lstStyle/>
-                    <a:p>
-                      <a:pPr algn="r" fontAlgn="b"/>
-                      <a:r>
-                        <a:rPr lang="en-US" sz="1100" b="0" i="0" u="none" strike="noStrike" dirty="0" smtClean="0">
-                          <a:solidFill>
-                            <a:srgbClr val="000000"/>
-                          </a:solidFill>
-                          <a:effectLst/>
-                          <a:latin typeface="Batang" panose="02030600000101010101" pitchFamily="18" charset="-127"/>
-                          <a:ea typeface="Batang" panose="02030600000101010101" pitchFamily="18" charset="-127"/>
-                        </a:rPr>
-                        <a:t>129.20</a:t>
+                        <a:rPr lang="en-US" sz="1100" b="0" i="0" u="none" strike="noStrike" smtClean="0">
+                          <a:solidFill>
+                            <a:srgbClr val="000000"/>
+                          </a:solidFill>
+                          <a:effectLst/>
+                          <a:latin typeface="Batang" panose="02030600000101010101" pitchFamily="18" charset="-127"/>
+                          <a:ea typeface="Batang" panose="02030600000101010101" pitchFamily="18" charset="-127"/>
+                        </a:rPr>
+                        <a:t>0.20</a:t>
                       </a:r>
                       <a:endParaRPr lang="en-US" sz="1100" b="0" i="0" u="none" strike="noStrike" dirty="0">
                         <a:solidFill>
@@ -14949,35 +14823,96 @@
                           <a:latin typeface="Batang" panose="02030600000101010101" pitchFamily="18" charset="-127"/>
                           <a:ea typeface="Batang" panose="02030600000101010101" pitchFamily="18" charset="-127"/>
                         </a:rPr>
-                        <a:t>30952</a:t>
-                      </a:r>
-                    </a:p>
-                  </a:txBody>
-                  <a:tcPr marL="9525" marR="9525" marT="9525" marB="0" anchor="b"/>
-                </a:tc>
-                <a:tc>
-                  <a:txBody>
-                    <a:bodyPr/>
-                    <a:lstStyle/>
-                    <a:p>
-                      <a:pPr algn="r" fontAlgn="b"/>
-                      <a:r>
-                        <a:rPr lang="en-US" sz="1100" b="0" i="0" u="none" strike="noStrike">
-                          <a:solidFill>
-                            <a:srgbClr val="000000"/>
-                          </a:solidFill>
-                          <a:effectLst/>
-                          <a:latin typeface="Batang" panose="02030600000101010101" pitchFamily="18" charset="-127"/>
-                          <a:ea typeface="Batang" panose="02030600000101010101" pitchFamily="18" charset="-127"/>
-                        </a:rPr>
-                        <a:t>16.81%</a:t>
-                      </a:r>
-                    </a:p>
-                  </a:txBody>
-                  <a:tcPr marL="9525" marR="9525" marT="9525" marB="0" anchor="b"/>
-                </a:tc>
-              </a:tr>
-              <a:tr h="370840">
+                        <a:t>37208</a:t>
+                      </a:r>
+                    </a:p>
+                  </a:txBody>
+                  <a:tcPr marL="9525" marR="9525" marT="9525" marB="0" anchor="b"/>
+                </a:tc>
+                <a:tc>
+                  <a:txBody>
+                    <a:bodyPr/>
+                    <a:lstStyle/>
+                    <a:p>
+                      <a:pPr algn="r" fontAlgn="b"/>
+                      <a:r>
+                        <a:rPr lang="en-US" sz="1100" b="0" i="0" u="none" strike="noStrike">
+                          <a:solidFill>
+                            <a:srgbClr val="000000"/>
+                          </a:solidFill>
+                          <a:effectLst/>
+                          <a:latin typeface="Batang" panose="02030600000101010101" pitchFamily="18" charset="-127"/>
+                          <a:ea typeface="Batang" panose="02030600000101010101" pitchFamily="18" charset="-127"/>
+                        </a:rPr>
+                        <a:t>91.54%</a:t>
+                      </a:r>
+                    </a:p>
+                  </a:txBody>
+                  <a:tcPr marL="9525" marR="9525" marT="9525" marB="0" anchor="b"/>
+                </a:tc>
+                <a:tc>
+                  <a:txBody>
+                    <a:bodyPr/>
+                    <a:lstStyle/>
+                    <a:p>
+                      <a:pPr algn="r" fontAlgn="b"/>
+                      <a:r>
+                        <a:rPr lang="en-US" sz="1100" b="0" i="0" u="none" strike="noStrike">
+                          <a:solidFill>
+                            <a:srgbClr val="000000"/>
+                          </a:solidFill>
+                          <a:effectLst/>
+                          <a:latin typeface="Batang" panose="02030600000101010101" pitchFamily="18" charset="-127"/>
+                          <a:ea typeface="Batang" panose="02030600000101010101" pitchFamily="18" charset="-127"/>
+                        </a:rPr>
+                        <a:t>TB</a:t>
+                      </a:r>
+                    </a:p>
+                  </a:txBody>
+                  <a:tcPr marL="9525" marR="9525" marT="9525" marB="0" anchor="b"/>
+                </a:tc>
+                <a:tc>
+                  <a:txBody>
+                    <a:bodyPr/>
+                    <a:lstStyle/>
+                    <a:p>
+                      <a:pPr algn="r" fontAlgn="b"/>
+                      <a:r>
+                        <a:rPr lang="en-US" sz="1100" b="0" i="0" u="none" strike="noStrike">
+                          <a:solidFill>
+                            <a:srgbClr val="000000"/>
+                          </a:solidFill>
+                          <a:effectLst/>
+                          <a:latin typeface="Batang" panose="02030600000101010101" pitchFamily="18" charset="-127"/>
+                          <a:ea typeface="Batang" panose="02030600000101010101" pitchFamily="18" charset="-127"/>
+                        </a:rPr>
+                        <a:t>TB</a:t>
+                      </a:r>
+                    </a:p>
+                  </a:txBody>
+                  <a:tcPr marL="9525" marR="9525" marT="9525" marB="0" anchor="b"/>
+                </a:tc>
+                <a:tc>
+                  <a:txBody>
+                    <a:bodyPr/>
+                    <a:lstStyle/>
+                    <a:p>
+                      <a:pPr algn="r" fontAlgn="b"/>
+                      <a:r>
+                        <a:rPr lang="en-US" sz="1100" b="0" i="0" u="none" strike="noStrike">
+                          <a:solidFill>
+                            <a:srgbClr val="000000"/>
+                          </a:solidFill>
+                          <a:effectLst/>
+                          <a:latin typeface="Batang" panose="02030600000101010101" pitchFamily="18" charset="-127"/>
+                          <a:ea typeface="Batang" panose="02030600000101010101" pitchFamily="18" charset="-127"/>
+                        </a:rPr>
+                        <a:t>TB</a:t>
+                      </a:r>
+                    </a:p>
+                  </a:txBody>
+                  <a:tcPr marL="9525" marR="9525" marT="9525" marB="0" anchor="b"/>
+                </a:tc>
                 <a:tc>
                   <a:txBody>
                     <a:bodyPr/>
@@ -14993,7 +14928,7 @@
                           <a:latin typeface="Batang" panose="02030600000101010101" pitchFamily="18" charset="-127"/>
                           <a:ea typeface="Batang" panose="02030600000101010101" pitchFamily="18" charset="-127"/>
                         </a:rPr>
-                        <a:t>900</a:t>
+                        <a:t>129.20</a:t>
                       </a:r>
                       <a:endParaRPr lang="en-US" sz="1100" b="0" i="0" u="none" strike="noStrike" dirty="0">
                         <a:solidFill>
@@ -15022,138 +14957,35 @@
                           <a:latin typeface="Batang" panose="02030600000101010101" pitchFamily="18" charset="-127"/>
                           <a:ea typeface="Batang" panose="02030600000101010101" pitchFamily="18" charset="-127"/>
                         </a:rPr>
-                        <a:t>468965</a:t>
-                      </a:r>
-                    </a:p>
-                  </a:txBody>
-                  <a:tcPr marL="9525" marR="9525" marT="9525" marB="0" anchor="b"/>
-                </a:tc>
-                <a:tc>
-                  <a:txBody>
-                    <a:bodyPr/>
-                    <a:lstStyle/>
-                    <a:p>
-                      <a:pPr algn="r" fontAlgn="b"/>
-                      <a:r>
-                        <a:rPr lang="en-US" sz="1100" b="0" i="0" u="none" strike="noStrike">
-                          <a:solidFill>
-                            <a:srgbClr val="000000"/>
-                          </a:solidFill>
-                          <a:effectLst/>
-                          <a:latin typeface="Batang" panose="02030600000101010101" pitchFamily="18" charset="-127"/>
-                          <a:ea typeface="Batang" panose="02030600000101010101" pitchFamily="18" charset="-127"/>
-                        </a:rPr>
-                        <a:t>0.24</a:t>
-                      </a:r>
-                    </a:p>
-                  </a:txBody>
-                  <a:tcPr marL="9525" marR="9525" marT="9525" marB="0" anchor="b"/>
-                </a:tc>
-                <a:tc>
-                  <a:txBody>
-                    <a:bodyPr/>
-                    <a:lstStyle/>
-                    <a:p>
-                      <a:pPr algn="r" fontAlgn="b"/>
-                      <a:r>
-                        <a:rPr lang="en-US" sz="1100" b="0" i="0" u="none" strike="noStrike" dirty="0">
-                          <a:solidFill>
-                            <a:srgbClr val="000000"/>
-                          </a:solidFill>
-                          <a:effectLst/>
-                          <a:latin typeface="Batang" panose="02030600000101010101" pitchFamily="18" charset="-127"/>
-                          <a:ea typeface="Batang" panose="02030600000101010101" pitchFamily="18" charset="-127"/>
-                        </a:rPr>
-                        <a:t>38559</a:t>
-                      </a:r>
-                    </a:p>
-                  </a:txBody>
-                  <a:tcPr marL="9525" marR="9525" marT="9525" marB="0" anchor="b"/>
-                </a:tc>
-                <a:tc>
-                  <a:txBody>
-                    <a:bodyPr/>
-                    <a:lstStyle/>
-                    <a:p>
-                      <a:pPr algn="r" fontAlgn="b"/>
-                      <a:r>
-                        <a:rPr lang="en-US" sz="1100" b="0" i="0" u="none" strike="noStrike">
-                          <a:solidFill>
-                            <a:srgbClr val="000000"/>
-                          </a:solidFill>
-                          <a:effectLst/>
-                          <a:latin typeface="Batang" panose="02030600000101010101" pitchFamily="18" charset="-127"/>
-                          <a:ea typeface="Batang" panose="02030600000101010101" pitchFamily="18" charset="-127"/>
-                        </a:rPr>
-                        <a:t>91.78%</a:t>
-                      </a:r>
-                    </a:p>
-                  </a:txBody>
-                  <a:tcPr marL="9525" marR="9525" marT="9525" marB="0" anchor="b"/>
-                </a:tc>
-                <a:tc>
-                  <a:txBody>
-                    <a:bodyPr/>
-                    <a:lstStyle/>
-                    <a:p>
-                      <a:pPr algn="r" fontAlgn="b"/>
-                      <a:r>
-                        <a:rPr lang="en-US" sz="1100" b="0" i="0" u="none" strike="noStrike">
-                          <a:solidFill>
-                            <a:srgbClr val="000000"/>
-                          </a:solidFill>
-                          <a:effectLst/>
-                          <a:latin typeface="Batang" panose="02030600000101010101" pitchFamily="18" charset="-127"/>
-                          <a:ea typeface="Batang" panose="02030600000101010101" pitchFamily="18" charset="-127"/>
-                        </a:rPr>
-                        <a:t>TB</a:t>
-                      </a:r>
-                    </a:p>
-                  </a:txBody>
-                  <a:tcPr marL="9525" marR="9525" marT="9525" marB="0" anchor="b"/>
-                </a:tc>
-                <a:tc>
-                  <a:txBody>
-                    <a:bodyPr/>
-                    <a:lstStyle/>
-                    <a:p>
-                      <a:pPr algn="r" fontAlgn="b"/>
-                      <a:r>
-                        <a:rPr lang="en-US" sz="1100" b="0" i="0" u="none" strike="noStrike">
-                          <a:solidFill>
-                            <a:srgbClr val="000000"/>
-                          </a:solidFill>
-                          <a:effectLst/>
-                          <a:latin typeface="Batang" panose="02030600000101010101" pitchFamily="18" charset="-127"/>
-                          <a:ea typeface="Batang" panose="02030600000101010101" pitchFamily="18" charset="-127"/>
-                        </a:rPr>
-                        <a:t>TB</a:t>
-                      </a:r>
-                    </a:p>
-                  </a:txBody>
-                  <a:tcPr marL="9525" marR="9525" marT="9525" marB="0" anchor="b"/>
-                </a:tc>
-                <a:tc>
-                  <a:txBody>
-                    <a:bodyPr/>
-                    <a:lstStyle/>
-                    <a:p>
-                      <a:pPr algn="r" fontAlgn="b"/>
-                      <a:r>
-                        <a:rPr lang="en-US" sz="1100" b="0" i="0" u="none" strike="noStrike">
-                          <a:solidFill>
-                            <a:srgbClr val="000000"/>
-                          </a:solidFill>
-                          <a:effectLst/>
-                          <a:latin typeface="Batang" panose="02030600000101010101" pitchFamily="18" charset="-127"/>
-                          <a:ea typeface="Batang" panose="02030600000101010101" pitchFamily="18" charset="-127"/>
-                        </a:rPr>
-                        <a:t>TB</a:t>
-                      </a:r>
-                    </a:p>
-                  </a:txBody>
-                  <a:tcPr marL="9525" marR="9525" marT="9525" marB="0" anchor="b"/>
-                </a:tc>
+                        <a:t>30952</a:t>
+                      </a:r>
+                    </a:p>
+                  </a:txBody>
+                  <a:tcPr marL="9525" marR="9525" marT="9525" marB="0" anchor="b"/>
+                </a:tc>
+                <a:tc>
+                  <a:txBody>
+                    <a:bodyPr/>
+                    <a:lstStyle/>
+                    <a:p>
+                      <a:pPr algn="r" fontAlgn="b"/>
+                      <a:r>
+                        <a:rPr lang="en-US" sz="1100" b="0" i="0" u="none" strike="noStrike">
+                          <a:solidFill>
+                            <a:srgbClr val="000000"/>
+                          </a:solidFill>
+                          <a:effectLst/>
+                          <a:latin typeface="Batang" panose="02030600000101010101" pitchFamily="18" charset="-127"/>
+                          <a:ea typeface="Batang" panose="02030600000101010101" pitchFamily="18" charset="-127"/>
+                        </a:rPr>
+                        <a:t>16.81%</a:t>
+                      </a:r>
+                    </a:p>
+                  </a:txBody>
+                  <a:tcPr marL="9525" marR="9525" marT="9525" marB="0" anchor="b"/>
+                </a:tc>
+              </a:tr>
+              <a:tr h="370840">
                 <a:tc>
                   <a:txBody>
                     <a:bodyPr/>
@@ -15169,7 +15001,7 @@
                           <a:latin typeface="Batang" panose="02030600000101010101" pitchFamily="18" charset="-127"/>
                           <a:ea typeface="Batang" panose="02030600000101010101" pitchFamily="18" charset="-127"/>
                         </a:rPr>
-                        <a:t>143.40</a:t>
+                        <a:t>900</a:t>
                       </a:r>
                       <a:endParaRPr lang="en-US" sz="1100" b="0" i="0" u="none" strike="noStrike" dirty="0">
                         <a:solidFill>
@@ -15198,35 +15030,138 @@
                           <a:latin typeface="Batang" panose="02030600000101010101" pitchFamily="18" charset="-127"/>
                           <a:ea typeface="Batang" panose="02030600000101010101" pitchFamily="18" charset="-127"/>
                         </a:rPr>
-                        <a:t>32014</a:t>
-                      </a:r>
-                    </a:p>
-                  </a:txBody>
-                  <a:tcPr marL="9525" marR="9525" marT="9525" marB="0" anchor="b"/>
-                </a:tc>
-                <a:tc>
-                  <a:txBody>
-                    <a:bodyPr/>
-                    <a:lstStyle/>
-                    <a:p>
-                      <a:pPr algn="r" fontAlgn="b"/>
-                      <a:r>
-                        <a:rPr lang="en-US" sz="1100" b="0" i="0" u="none" strike="noStrike">
-                          <a:solidFill>
-                            <a:srgbClr val="000000"/>
-                          </a:solidFill>
-                          <a:effectLst/>
-                          <a:latin typeface="Batang" panose="02030600000101010101" pitchFamily="18" charset="-127"/>
-                          <a:ea typeface="Batang" panose="02030600000101010101" pitchFamily="18" charset="-127"/>
-                        </a:rPr>
-                        <a:t>16.97%</a:t>
-                      </a:r>
-                    </a:p>
-                  </a:txBody>
-                  <a:tcPr marL="9525" marR="9525" marT="9525" marB="0" anchor="b"/>
-                </a:tc>
-              </a:tr>
-              <a:tr h="370840">
+                        <a:t>468965</a:t>
+                      </a:r>
+                    </a:p>
+                  </a:txBody>
+                  <a:tcPr marL="9525" marR="9525" marT="9525" marB="0" anchor="b"/>
+                </a:tc>
+                <a:tc>
+                  <a:txBody>
+                    <a:bodyPr/>
+                    <a:lstStyle/>
+                    <a:p>
+                      <a:pPr algn="r" fontAlgn="b"/>
+                      <a:r>
+                        <a:rPr lang="en-US" sz="1100" b="0" i="0" u="none" strike="noStrike">
+                          <a:solidFill>
+                            <a:srgbClr val="000000"/>
+                          </a:solidFill>
+                          <a:effectLst/>
+                          <a:latin typeface="Batang" panose="02030600000101010101" pitchFamily="18" charset="-127"/>
+                          <a:ea typeface="Batang" panose="02030600000101010101" pitchFamily="18" charset="-127"/>
+                        </a:rPr>
+                        <a:t>0.24</a:t>
+                      </a:r>
+                    </a:p>
+                  </a:txBody>
+                  <a:tcPr marL="9525" marR="9525" marT="9525" marB="0" anchor="b"/>
+                </a:tc>
+                <a:tc>
+                  <a:txBody>
+                    <a:bodyPr/>
+                    <a:lstStyle/>
+                    <a:p>
+                      <a:pPr algn="r" fontAlgn="b"/>
+                      <a:r>
+                        <a:rPr lang="en-US" sz="1100" b="0" i="0" u="none" strike="noStrike" dirty="0">
+                          <a:solidFill>
+                            <a:srgbClr val="000000"/>
+                          </a:solidFill>
+                          <a:effectLst/>
+                          <a:latin typeface="Batang" panose="02030600000101010101" pitchFamily="18" charset="-127"/>
+                          <a:ea typeface="Batang" panose="02030600000101010101" pitchFamily="18" charset="-127"/>
+                        </a:rPr>
+                        <a:t>38559</a:t>
+                      </a:r>
+                    </a:p>
+                  </a:txBody>
+                  <a:tcPr marL="9525" marR="9525" marT="9525" marB="0" anchor="b"/>
+                </a:tc>
+                <a:tc>
+                  <a:txBody>
+                    <a:bodyPr/>
+                    <a:lstStyle/>
+                    <a:p>
+                      <a:pPr algn="r" fontAlgn="b"/>
+                      <a:r>
+                        <a:rPr lang="en-US" sz="1100" b="0" i="0" u="none" strike="noStrike">
+                          <a:solidFill>
+                            <a:srgbClr val="000000"/>
+                          </a:solidFill>
+                          <a:effectLst/>
+                          <a:latin typeface="Batang" panose="02030600000101010101" pitchFamily="18" charset="-127"/>
+                          <a:ea typeface="Batang" panose="02030600000101010101" pitchFamily="18" charset="-127"/>
+                        </a:rPr>
+                        <a:t>91.78%</a:t>
+                      </a:r>
+                    </a:p>
+                  </a:txBody>
+                  <a:tcPr marL="9525" marR="9525" marT="9525" marB="0" anchor="b"/>
+                </a:tc>
+                <a:tc>
+                  <a:txBody>
+                    <a:bodyPr/>
+                    <a:lstStyle/>
+                    <a:p>
+                      <a:pPr algn="r" fontAlgn="b"/>
+                      <a:r>
+                        <a:rPr lang="en-US" sz="1100" b="0" i="0" u="none" strike="noStrike">
+                          <a:solidFill>
+                            <a:srgbClr val="000000"/>
+                          </a:solidFill>
+                          <a:effectLst/>
+                          <a:latin typeface="Batang" panose="02030600000101010101" pitchFamily="18" charset="-127"/>
+                          <a:ea typeface="Batang" panose="02030600000101010101" pitchFamily="18" charset="-127"/>
+                        </a:rPr>
+                        <a:t>TB</a:t>
+                      </a:r>
+                    </a:p>
+                  </a:txBody>
+                  <a:tcPr marL="9525" marR="9525" marT="9525" marB="0" anchor="b"/>
+                </a:tc>
+                <a:tc>
+                  <a:txBody>
+                    <a:bodyPr/>
+                    <a:lstStyle/>
+                    <a:p>
+                      <a:pPr algn="r" fontAlgn="b"/>
+                      <a:r>
+                        <a:rPr lang="en-US" sz="1100" b="0" i="0" u="none" strike="noStrike">
+                          <a:solidFill>
+                            <a:srgbClr val="000000"/>
+                          </a:solidFill>
+                          <a:effectLst/>
+                          <a:latin typeface="Batang" panose="02030600000101010101" pitchFamily="18" charset="-127"/>
+                          <a:ea typeface="Batang" panose="02030600000101010101" pitchFamily="18" charset="-127"/>
+                        </a:rPr>
+                        <a:t>TB</a:t>
+                      </a:r>
+                    </a:p>
+                  </a:txBody>
+                  <a:tcPr marL="9525" marR="9525" marT="9525" marB="0" anchor="b"/>
+                </a:tc>
+                <a:tc>
+                  <a:txBody>
+                    <a:bodyPr/>
+                    <a:lstStyle/>
+                    <a:p>
+                      <a:pPr algn="r" fontAlgn="b"/>
+                      <a:r>
+                        <a:rPr lang="en-US" sz="1100" b="0" i="0" u="none" strike="noStrike">
+                          <a:solidFill>
+                            <a:srgbClr val="000000"/>
+                          </a:solidFill>
+                          <a:effectLst/>
+                          <a:latin typeface="Batang" panose="02030600000101010101" pitchFamily="18" charset="-127"/>
+                          <a:ea typeface="Batang" panose="02030600000101010101" pitchFamily="18" charset="-127"/>
+                        </a:rPr>
+                        <a:t>TB</a:t>
+                      </a:r>
+                    </a:p>
+                  </a:txBody>
+                  <a:tcPr marL="9525" marR="9525" marT="9525" marB="0" anchor="b"/>
+                </a:tc>
                 <a:tc>
                   <a:txBody>
                     <a:bodyPr/>
@@ -15242,7 +15177,7 @@
                           <a:latin typeface="Batang" panose="02030600000101010101" pitchFamily="18" charset="-127"/>
                           <a:ea typeface="Batang" panose="02030600000101010101" pitchFamily="18" charset="-127"/>
                         </a:rPr>
-                        <a:t>950</a:t>
+                        <a:t>143.40</a:t>
                       </a:r>
                       <a:endParaRPr lang="en-US" sz="1100" b="0" i="0" u="none" strike="noStrike" dirty="0">
                         <a:solidFill>
@@ -15271,196 +15206,28 @@
                           <a:latin typeface="Batang" panose="02030600000101010101" pitchFamily="18" charset="-127"/>
                           <a:ea typeface="Batang" panose="02030600000101010101" pitchFamily="18" charset="-127"/>
                         </a:rPr>
-                        <a:t>494474</a:t>
-                      </a:r>
-                    </a:p>
-                  </a:txBody>
-                  <a:tcPr marL="9525" marR="9525" marT="9525" marB="0" anchor="b"/>
-                </a:tc>
-                <a:tc>
-                  <a:txBody>
-                    <a:bodyPr/>
-                    <a:lstStyle/>
-                    <a:p>
-                      <a:pPr algn="r" fontAlgn="b"/>
-                      <a:r>
-                        <a:rPr lang="en-US" sz="1100" b="0" i="0" u="none" strike="noStrike">
-                          <a:solidFill>
-                            <a:srgbClr val="000000"/>
-                          </a:solidFill>
-                          <a:effectLst/>
-                          <a:latin typeface="Batang" panose="02030600000101010101" pitchFamily="18" charset="-127"/>
-                          <a:ea typeface="Batang" panose="02030600000101010101" pitchFamily="18" charset="-127"/>
-                        </a:rPr>
-                        <a:t>0.26</a:t>
-                      </a:r>
-                    </a:p>
-                  </a:txBody>
-                  <a:tcPr marL="9525" marR="9525" marT="9525" marB="0" anchor="b"/>
-                </a:tc>
-                <a:tc>
-                  <a:txBody>
-                    <a:bodyPr/>
-                    <a:lstStyle/>
-                    <a:p>
-                      <a:pPr algn="r" fontAlgn="b"/>
-                      <a:r>
-                        <a:rPr lang="en-US" sz="1100" b="0" i="0" u="none" strike="noStrike">
-                          <a:solidFill>
-                            <a:srgbClr val="000000"/>
-                          </a:solidFill>
-                          <a:effectLst/>
-                          <a:latin typeface="Batang" panose="02030600000101010101" pitchFamily="18" charset="-127"/>
-                          <a:ea typeface="Batang" panose="02030600000101010101" pitchFamily="18" charset="-127"/>
-                        </a:rPr>
-                        <a:t>39713</a:t>
-                      </a:r>
-                    </a:p>
-                  </a:txBody>
-                  <a:tcPr marL="9525" marR="9525" marT="9525" marB="0" anchor="b"/>
-                </a:tc>
-                <a:tc>
-                  <a:txBody>
-                    <a:bodyPr/>
-                    <a:lstStyle/>
-                    <a:p>
-                      <a:pPr algn="r" fontAlgn="b"/>
-                      <a:r>
-                        <a:rPr lang="en-US" sz="1100" b="0" i="0" u="none" strike="noStrike" dirty="0">
-                          <a:solidFill>
-                            <a:srgbClr val="000000"/>
-                          </a:solidFill>
-                          <a:effectLst/>
-                          <a:latin typeface="Batang" panose="02030600000101010101" pitchFamily="18" charset="-127"/>
-                          <a:ea typeface="Batang" panose="02030600000101010101" pitchFamily="18" charset="-127"/>
-                        </a:rPr>
-                        <a:t>91.97%</a:t>
-                      </a:r>
-                    </a:p>
-                  </a:txBody>
-                  <a:tcPr marL="9525" marR="9525" marT="9525" marB="0" anchor="b"/>
-                </a:tc>
-                <a:tc>
-                  <a:txBody>
-                    <a:bodyPr/>
-                    <a:lstStyle/>
-                    <a:p>
-                      <a:pPr algn="r" fontAlgn="b"/>
-                      <a:r>
-                        <a:rPr lang="en-US" sz="1100" b="0" i="0" u="none" strike="noStrike" dirty="0">
-                          <a:solidFill>
-                            <a:srgbClr val="000000"/>
-                          </a:solidFill>
-                          <a:effectLst/>
-                          <a:latin typeface="Batang" panose="02030600000101010101" pitchFamily="18" charset="-127"/>
-                          <a:ea typeface="Batang" panose="02030600000101010101" pitchFamily="18" charset="-127"/>
-                        </a:rPr>
-                        <a:t>TB</a:t>
-                      </a:r>
-                    </a:p>
-                  </a:txBody>
-                  <a:tcPr marL="9525" marR="9525" marT="9525" marB="0" anchor="b"/>
-                </a:tc>
-                <a:tc>
-                  <a:txBody>
-                    <a:bodyPr/>
-                    <a:lstStyle/>
-                    <a:p>
-                      <a:pPr algn="r" fontAlgn="b"/>
-                      <a:r>
-                        <a:rPr lang="en-US" sz="1100" b="0" i="0" u="none" strike="noStrike">
-                          <a:solidFill>
-                            <a:srgbClr val="000000"/>
-                          </a:solidFill>
-                          <a:effectLst/>
-                          <a:latin typeface="Batang" panose="02030600000101010101" pitchFamily="18" charset="-127"/>
-                          <a:ea typeface="Batang" panose="02030600000101010101" pitchFamily="18" charset="-127"/>
-                        </a:rPr>
-                        <a:t>TB</a:t>
-                      </a:r>
-                    </a:p>
-                  </a:txBody>
-                  <a:tcPr marL="9525" marR="9525" marT="9525" marB="0" anchor="b"/>
-                </a:tc>
-                <a:tc>
-                  <a:txBody>
-                    <a:bodyPr/>
-                    <a:lstStyle/>
-                    <a:p>
-                      <a:pPr algn="r" fontAlgn="b"/>
-                      <a:r>
-                        <a:rPr lang="en-US" sz="1100" b="0" i="0" u="none" strike="noStrike">
-                          <a:solidFill>
-                            <a:srgbClr val="000000"/>
-                          </a:solidFill>
-                          <a:effectLst/>
-                          <a:latin typeface="Batang" panose="02030600000101010101" pitchFamily="18" charset="-127"/>
-                          <a:ea typeface="Batang" panose="02030600000101010101" pitchFamily="18" charset="-127"/>
-                        </a:rPr>
-                        <a:t>TB</a:t>
-                      </a:r>
-                    </a:p>
-                  </a:txBody>
-                  <a:tcPr marL="9525" marR="9525" marT="9525" marB="0" anchor="b"/>
-                </a:tc>
-                <a:tc>
-                  <a:txBody>
-                    <a:bodyPr/>
-                    <a:lstStyle/>
-                    <a:p>
-                      <a:pPr algn="r" fontAlgn="b"/>
-                      <a:r>
-                        <a:rPr lang="en-US" sz="1100" b="0" i="0" u="none" strike="noStrike">
-                          <a:solidFill>
-                            <a:srgbClr val="000000"/>
-                          </a:solidFill>
-                          <a:effectLst/>
-                          <a:latin typeface="Batang" panose="02030600000101010101" pitchFamily="18" charset="-127"/>
-                          <a:ea typeface="Batang" panose="02030600000101010101" pitchFamily="18" charset="-127"/>
-                        </a:rPr>
-                        <a:t>150.76</a:t>
-                      </a:r>
-                    </a:p>
-                  </a:txBody>
-                  <a:tcPr marL="9525" marR="9525" marT="9525" marB="0" anchor="b"/>
-                </a:tc>
-                <a:tc>
-                  <a:txBody>
-                    <a:bodyPr/>
-                    <a:lstStyle/>
-                    <a:p>
-                      <a:pPr algn="r" fontAlgn="b"/>
-                      <a:r>
-                        <a:rPr lang="en-US" sz="1100" b="0" i="0" u="none" strike="noStrike">
-                          <a:solidFill>
-                            <a:srgbClr val="000000"/>
-                          </a:solidFill>
-                          <a:effectLst/>
-                          <a:latin typeface="Batang" panose="02030600000101010101" pitchFamily="18" charset="-127"/>
-                          <a:ea typeface="Batang" panose="02030600000101010101" pitchFamily="18" charset="-127"/>
-                        </a:rPr>
-                        <a:t>32866</a:t>
-                      </a:r>
-                    </a:p>
-                  </a:txBody>
-                  <a:tcPr marL="9525" marR="9525" marT="9525" marB="0" anchor="b"/>
-                </a:tc>
-                <a:tc>
-                  <a:txBody>
-                    <a:bodyPr/>
-                    <a:lstStyle/>
-                    <a:p>
-                      <a:pPr algn="r" fontAlgn="b"/>
-                      <a:r>
-                        <a:rPr lang="en-US" sz="1100" b="0" i="0" u="none" strike="noStrike">
-                          <a:solidFill>
-                            <a:srgbClr val="000000"/>
-                          </a:solidFill>
-                          <a:effectLst/>
-                          <a:latin typeface="Batang" panose="02030600000101010101" pitchFamily="18" charset="-127"/>
-                          <a:ea typeface="Batang" panose="02030600000101010101" pitchFamily="18" charset="-127"/>
-                        </a:rPr>
-                        <a:t>17.24%</a:t>
+                        <a:t>32014</a:t>
+                      </a:r>
+                    </a:p>
+                  </a:txBody>
+                  <a:tcPr marL="9525" marR="9525" marT="9525" marB="0" anchor="b"/>
+                </a:tc>
+                <a:tc>
+                  <a:txBody>
+                    <a:bodyPr/>
+                    <a:lstStyle/>
+                    <a:p>
+                      <a:pPr algn="r" fontAlgn="b"/>
+                      <a:r>
+                        <a:rPr lang="en-US" sz="1100" b="0" i="0" u="none" strike="noStrike">
+                          <a:solidFill>
+                            <a:srgbClr val="000000"/>
+                          </a:solidFill>
+                          <a:effectLst/>
+                          <a:latin typeface="Batang" panose="02030600000101010101" pitchFamily="18" charset="-127"/>
+                          <a:ea typeface="Batang" panose="02030600000101010101" pitchFamily="18" charset="-127"/>
+                        </a:rPr>
+                        <a:t>16.97%</a:t>
                       </a:r>
                     </a:p>
                   </a:txBody>
@@ -15483,7 +15250,7 @@
                           <a:latin typeface="Batang" panose="02030600000101010101" pitchFamily="18" charset="-127"/>
                           <a:ea typeface="Batang" panose="02030600000101010101" pitchFamily="18" charset="-127"/>
                         </a:rPr>
-                        <a:t>1000</a:t>
+                        <a:t>950</a:t>
                       </a:r>
                       <a:endParaRPr lang="en-US" sz="1100" b="0" i="0" u="none" strike="noStrike" dirty="0">
                         <a:solidFill>
@@ -15504,6 +15271,69 @@
                     <a:p>
                       <a:pPr algn="r" fontAlgn="b"/>
                       <a:r>
+                        <a:rPr lang="en-US" sz="1100" b="0" i="0" u="none" strike="noStrike">
+                          <a:solidFill>
+                            <a:srgbClr val="000000"/>
+                          </a:solidFill>
+                          <a:effectLst/>
+                          <a:latin typeface="Batang" panose="02030600000101010101" pitchFamily="18" charset="-127"/>
+                          <a:ea typeface="Batang" panose="02030600000101010101" pitchFamily="18" charset="-127"/>
+                        </a:rPr>
+                        <a:t>494474</a:t>
+                      </a:r>
+                    </a:p>
+                  </a:txBody>
+                  <a:tcPr marL="9525" marR="9525" marT="9525" marB="0" anchor="b"/>
+                </a:tc>
+                <a:tc>
+                  <a:txBody>
+                    <a:bodyPr/>
+                    <a:lstStyle/>
+                    <a:p>
+                      <a:pPr algn="r" fontAlgn="b"/>
+                      <a:r>
+                        <a:rPr lang="en-US" sz="1100" b="0" i="0" u="none" strike="noStrike">
+                          <a:solidFill>
+                            <a:srgbClr val="000000"/>
+                          </a:solidFill>
+                          <a:effectLst/>
+                          <a:latin typeface="Batang" panose="02030600000101010101" pitchFamily="18" charset="-127"/>
+                          <a:ea typeface="Batang" panose="02030600000101010101" pitchFamily="18" charset="-127"/>
+                        </a:rPr>
+                        <a:t>0.26</a:t>
+                      </a:r>
+                    </a:p>
+                  </a:txBody>
+                  <a:tcPr marL="9525" marR="9525" marT="9525" marB="0" anchor="b"/>
+                </a:tc>
+                <a:tc>
+                  <a:txBody>
+                    <a:bodyPr/>
+                    <a:lstStyle/>
+                    <a:p>
+                      <a:pPr algn="r" fontAlgn="b"/>
+                      <a:r>
+                        <a:rPr lang="en-US" sz="1100" b="0" i="0" u="none" strike="noStrike">
+                          <a:solidFill>
+                            <a:srgbClr val="000000"/>
+                          </a:solidFill>
+                          <a:effectLst/>
+                          <a:latin typeface="Batang" panose="02030600000101010101" pitchFamily="18" charset="-127"/>
+                          <a:ea typeface="Batang" panose="02030600000101010101" pitchFamily="18" charset="-127"/>
+                        </a:rPr>
+                        <a:t>39713</a:t>
+                      </a:r>
+                    </a:p>
+                  </a:txBody>
+                  <a:tcPr marL="9525" marR="9525" marT="9525" marB="0" anchor="b"/>
+                </a:tc>
+                <a:tc>
+                  <a:txBody>
+                    <a:bodyPr/>
+                    <a:lstStyle/>
+                    <a:p>
+                      <a:pPr algn="r" fontAlgn="b"/>
+                      <a:r>
                         <a:rPr lang="en-US" sz="1100" b="0" i="0" u="none" strike="noStrike" dirty="0">
                           <a:solidFill>
                             <a:srgbClr val="000000"/>
@@ -15512,7 +15342,7 @@
                           <a:latin typeface="Batang" panose="02030600000101010101" pitchFamily="18" charset="-127"/>
                           <a:ea typeface="Batang" panose="02030600000101010101" pitchFamily="18" charset="-127"/>
                         </a:rPr>
-                        <a:t>523200</a:t>
+                        <a:t>91.97%</a:t>
                       </a:r>
                     </a:p>
                   </a:txBody>
@@ -15533,69 +15363,6 @@
                           <a:latin typeface="Batang" panose="02030600000101010101" pitchFamily="18" charset="-127"/>
                           <a:ea typeface="Batang" panose="02030600000101010101" pitchFamily="18" charset="-127"/>
                         </a:rPr>
-                        <a:t>0.28</a:t>
-                      </a:r>
-                    </a:p>
-                  </a:txBody>
-                  <a:tcPr marL="9525" marR="9525" marT="9525" marB="0" anchor="b"/>
-                </a:tc>
-                <a:tc>
-                  <a:txBody>
-                    <a:bodyPr/>
-                    <a:lstStyle/>
-                    <a:p>
-                      <a:pPr algn="r" fontAlgn="b"/>
-                      <a:r>
-                        <a:rPr lang="en-US" sz="1100" b="0" i="0" u="none" strike="noStrike">
-                          <a:solidFill>
-                            <a:srgbClr val="000000"/>
-                          </a:solidFill>
-                          <a:effectLst/>
-                          <a:latin typeface="Batang" panose="02030600000101010101" pitchFamily="18" charset="-127"/>
-                          <a:ea typeface="Batang" panose="02030600000101010101" pitchFamily="18" charset="-127"/>
-                        </a:rPr>
-                        <a:t>41493</a:t>
-                      </a:r>
-                    </a:p>
-                  </a:txBody>
-                  <a:tcPr marL="9525" marR="9525" marT="9525" marB="0" anchor="b"/>
-                </a:tc>
-                <a:tc>
-                  <a:txBody>
-                    <a:bodyPr/>
-                    <a:lstStyle/>
-                    <a:p>
-                      <a:pPr algn="r" fontAlgn="b"/>
-                      <a:r>
-                        <a:rPr lang="en-US" sz="1100" b="0" i="0" u="none" strike="noStrike">
-                          <a:solidFill>
-                            <a:srgbClr val="000000"/>
-                          </a:solidFill>
-                          <a:effectLst/>
-                          <a:latin typeface="Batang" panose="02030600000101010101" pitchFamily="18" charset="-127"/>
-                          <a:ea typeface="Batang" panose="02030600000101010101" pitchFamily="18" charset="-127"/>
-                        </a:rPr>
-                        <a:t>92.07%</a:t>
-                      </a:r>
-                    </a:p>
-                  </a:txBody>
-                  <a:tcPr marL="9525" marR="9525" marT="9525" marB="0" anchor="b"/>
-                </a:tc>
-                <a:tc>
-                  <a:txBody>
-                    <a:bodyPr/>
-                    <a:lstStyle/>
-                    <a:p>
-                      <a:pPr algn="r" fontAlgn="b"/>
-                      <a:r>
-                        <a:rPr lang="en-US" sz="1100" b="0" i="0" u="none" strike="noStrike" dirty="0">
-                          <a:solidFill>
-                            <a:srgbClr val="000000"/>
-                          </a:solidFill>
-                          <a:effectLst/>
-                          <a:latin typeface="Batang" panose="02030600000101010101" pitchFamily="18" charset="-127"/>
-                          <a:ea typeface="Batang" panose="02030600000101010101" pitchFamily="18" charset="-127"/>
-                        </a:rPr>
                         <a:t>TB</a:t>
                       </a:r>
                     </a:p>
@@ -15609,7 +15376,7 @@
                     <a:p>
                       <a:pPr algn="r" fontAlgn="b"/>
                       <a:r>
-                        <a:rPr lang="en-US" sz="1100" b="0" i="0" u="none" strike="noStrike" dirty="0">
+                        <a:rPr lang="en-US" sz="1100" b="0" i="0" u="none" strike="noStrike">
                           <a:solidFill>
                             <a:srgbClr val="000000"/>
                           </a:solidFill>
@@ -15659,49 +15426,49 @@
                           <a:latin typeface="Batang" panose="02030600000101010101" pitchFamily="18" charset="-127"/>
                           <a:ea typeface="Batang" panose="02030600000101010101" pitchFamily="18" charset="-127"/>
                         </a:rPr>
-                        <a:t>155.77</a:t>
-                      </a:r>
-                    </a:p>
-                  </a:txBody>
-                  <a:tcPr marL="9525" marR="9525" marT="9525" marB="0" anchor="b"/>
-                </a:tc>
-                <a:tc>
-                  <a:txBody>
-                    <a:bodyPr/>
-                    <a:lstStyle/>
-                    <a:p>
-                      <a:pPr algn="r" fontAlgn="b"/>
-                      <a:r>
-                        <a:rPr lang="en-US" sz="1100" b="0" i="0" u="none" strike="noStrike">
-                          <a:solidFill>
-                            <a:srgbClr val="000000"/>
-                          </a:solidFill>
-                          <a:effectLst/>
-                          <a:latin typeface="Batang" panose="02030600000101010101" pitchFamily="18" charset="-127"/>
-                          <a:ea typeface="Batang" panose="02030600000101010101" pitchFamily="18" charset="-127"/>
-                        </a:rPr>
-                        <a:t>34495</a:t>
-                      </a:r>
-                    </a:p>
-                  </a:txBody>
-                  <a:tcPr marL="9525" marR="9525" marT="9525" marB="0" anchor="b"/>
-                </a:tc>
-                <a:tc>
-                  <a:txBody>
-                    <a:bodyPr/>
-                    <a:lstStyle/>
-                    <a:p>
-                      <a:pPr algn="r" fontAlgn="b"/>
-                      <a:r>
-                        <a:rPr lang="en-US" sz="1100" b="0" i="0" u="none" strike="noStrike" dirty="0">
-                          <a:solidFill>
-                            <a:srgbClr val="000000"/>
-                          </a:solidFill>
-                          <a:effectLst/>
-                          <a:latin typeface="Batang" panose="02030600000101010101" pitchFamily="18" charset="-127"/>
-                          <a:ea typeface="Batang" panose="02030600000101010101" pitchFamily="18" charset="-127"/>
-                        </a:rPr>
-                        <a:t>16.87%</a:t>
+                        <a:t>150.76</a:t>
+                      </a:r>
+                    </a:p>
+                  </a:txBody>
+                  <a:tcPr marL="9525" marR="9525" marT="9525" marB="0" anchor="b"/>
+                </a:tc>
+                <a:tc>
+                  <a:txBody>
+                    <a:bodyPr/>
+                    <a:lstStyle/>
+                    <a:p>
+                      <a:pPr algn="r" fontAlgn="b"/>
+                      <a:r>
+                        <a:rPr lang="en-US" sz="1100" b="0" i="0" u="none" strike="noStrike">
+                          <a:solidFill>
+                            <a:srgbClr val="000000"/>
+                          </a:solidFill>
+                          <a:effectLst/>
+                          <a:latin typeface="Batang" panose="02030600000101010101" pitchFamily="18" charset="-127"/>
+                          <a:ea typeface="Batang" panose="02030600000101010101" pitchFamily="18" charset="-127"/>
+                        </a:rPr>
+                        <a:t>32866</a:t>
+                      </a:r>
+                    </a:p>
+                  </a:txBody>
+                  <a:tcPr marL="9525" marR="9525" marT="9525" marB="0" anchor="b"/>
+                </a:tc>
+                <a:tc>
+                  <a:txBody>
+                    <a:bodyPr/>
+                    <a:lstStyle/>
+                    <a:p>
+                      <a:pPr algn="r" fontAlgn="b"/>
+                      <a:r>
+                        <a:rPr lang="en-US" sz="1100" b="0" i="0" u="none" strike="noStrike">
+                          <a:solidFill>
+                            <a:srgbClr val="000000"/>
+                          </a:solidFill>
+                          <a:effectLst/>
+                          <a:latin typeface="Batang" panose="02030600000101010101" pitchFamily="18" charset="-127"/>
+                          <a:ea typeface="Batang" panose="02030600000101010101" pitchFamily="18" charset="-127"/>
+                        </a:rPr>
+                        <a:t>17.24%</a:t>
                       </a:r>
                     </a:p>
                   </a:txBody>
@@ -15724,7 +15491,7 @@
                           <a:latin typeface="Batang" panose="02030600000101010101" pitchFamily="18" charset="-127"/>
                           <a:ea typeface="Batang" panose="02030600000101010101" pitchFamily="18" charset="-127"/>
                         </a:rPr>
-                        <a:t>1200</a:t>
+                        <a:t>1000</a:t>
                       </a:r>
                       <a:endParaRPr lang="en-US" sz="1100" b="0" i="0" u="none" strike="noStrike" dirty="0">
                         <a:solidFill>
@@ -15745,27 +15512,6 @@
                     <a:p>
                       <a:pPr algn="r" fontAlgn="b"/>
                       <a:r>
-                        <a:rPr lang="en-US" sz="1100" b="0" i="0" u="none" strike="noStrike">
-                          <a:solidFill>
-                            <a:srgbClr val="000000"/>
-                          </a:solidFill>
-                          <a:effectLst/>
-                          <a:latin typeface="Batang" panose="02030600000101010101" pitchFamily="18" charset="-127"/>
-                          <a:ea typeface="Batang" panose="02030600000101010101" pitchFamily="18" charset="-127"/>
-                        </a:rPr>
-                        <a:t>631316</a:t>
-                      </a:r>
-                    </a:p>
-                  </a:txBody>
-                  <a:tcPr marL="9525" marR="9525" marT="9525" marB="0" anchor="b"/>
-                </a:tc>
-                <a:tc>
-                  <a:txBody>
-                    <a:bodyPr/>
-                    <a:lstStyle/>
-                    <a:p>
-                      <a:pPr algn="r" fontAlgn="b"/>
-                      <a:r>
                         <a:rPr lang="en-US" sz="1100" b="0" i="0" u="none" strike="noStrike" dirty="0">
                           <a:solidFill>
                             <a:srgbClr val="000000"/>
@@ -15774,7 +15520,7 @@
                           <a:latin typeface="Batang" panose="02030600000101010101" pitchFamily="18" charset="-127"/>
                           <a:ea typeface="Batang" panose="02030600000101010101" pitchFamily="18" charset="-127"/>
                         </a:rPr>
-                        <a:t>0.42</a:t>
+                        <a:t>523200</a:t>
                       </a:r>
                     </a:p>
                   </a:txBody>
@@ -15795,7 +15541,49 @@
                           <a:latin typeface="Batang" panose="02030600000101010101" pitchFamily="18" charset="-127"/>
                           <a:ea typeface="Batang" panose="02030600000101010101" pitchFamily="18" charset="-127"/>
                         </a:rPr>
-                        <a:t>45964</a:t>
+                        <a:t>0.28</a:t>
+                      </a:r>
+                    </a:p>
+                  </a:txBody>
+                  <a:tcPr marL="9525" marR="9525" marT="9525" marB="0" anchor="b"/>
+                </a:tc>
+                <a:tc>
+                  <a:txBody>
+                    <a:bodyPr/>
+                    <a:lstStyle/>
+                    <a:p>
+                      <a:pPr algn="r" fontAlgn="b"/>
+                      <a:r>
+                        <a:rPr lang="en-US" sz="1100" b="0" i="0" u="none" strike="noStrike">
+                          <a:solidFill>
+                            <a:srgbClr val="000000"/>
+                          </a:solidFill>
+                          <a:effectLst/>
+                          <a:latin typeface="Batang" panose="02030600000101010101" pitchFamily="18" charset="-127"/>
+                          <a:ea typeface="Batang" panose="02030600000101010101" pitchFamily="18" charset="-127"/>
+                        </a:rPr>
+                        <a:t>41493</a:t>
+                      </a:r>
+                    </a:p>
+                  </a:txBody>
+                  <a:tcPr marL="9525" marR="9525" marT="9525" marB="0" anchor="b"/>
+                </a:tc>
+                <a:tc>
+                  <a:txBody>
+                    <a:bodyPr/>
+                    <a:lstStyle/>
+                    <a:p>
+                      <a:pPr algn="r" fontAlgn="b"/>
+                      <a:r>
+                        <a:rPr lang="en-US" sz="1100" b="0" i="0" u="none" strike="noStrike">
+                          <a:solidFill>
+                            <a:srgbClr val="000000"/>
+                          </a:solidFill>
+                          <a:effectLst/>
+                          <a:latin typeface="Batang" panose="02030600000101010101" pitchFamily="18" charset="-127"/>
+                          <a:ea typeface="Batang" panose="02030600000101010101" pitchFamily="18" charset="-127"/>
+                        </a:rPr>
+                        <a:t>92.07%</a:t>
                       </a:r>
                     </a:p>
                   </a:txBody>
@@ -15816,7 +15604,7 @@
                           <a:latin typeface="Batang" panose="02030600000101010101" pitchFamily="18" charset="-127"/>
                           <a:ea typeface="Batang" panose="02030600000101010101" pitchFamily="18" charset="-127"/>
                         </a:rPr>
-                        <a:t>92.72%</a:t>
+                        <a:t>TB</a:t>
                       </a:r>
                     </a:p>
                   </a:txBody>
@@ -15850,6 +15638,69 @@
                     <a:p>
                       <a:pPr algn="r" fontAlgn="b"/>
                       <a:r>
+                        <a:rPr lang="en-US" sz="1100" b="0" i="0" u="none" strike="noStrike">
+                          <a:solidFill>
+                            <a:srgbClr val="000000"/>
+                          </a:solidFill>
+                          <a:effectLst/>
+                          <a:latin typeface="Batang" panose="02030600000101010101" pitchFamily="18" charset="-127"/>
+                          <a:ea typeface="Batang" panose="02030600000101010101" pitchFamily="18" charset="-127"/>
+                        </a:rPr>
+                        <a:t>TB</a:t>
+                      </a:r>
+                    </a:p>
+                  </a:txBody>
+                  <a:tcPr marL="9525" marR="9525" marT="9525" marB="0" anchor="b"/>
+                </a:tc>
+                <a:tc>
+                  <a:txBody>
+                    <a:bodyPr/>
+                    <a:lstStyle/>
+                    <a:p>
+                      <a:pPr algn="r" fontAlgn="b"/>
+                      <a:r>
+                        <a:rPr lang="en-US" sz="1100" b="0" i="0" u="none" strike="noStrike">
+                          <a:solidFill>
+                            <a:srgbClr val="000000"/>
+                          </a:solidFill>
+                          <a:effectLst/>
+                          <a:latin typeface="Batang" panose="02030600000101010101" pitchFamily="18" charset="-127"/>
+                          <a:ea typeface="Batang" panose="02030600000101010101" pitchFamily="18" charset="-127"/>
+                        </a:rPr>
+                        <a:t>155.77</a:t>
+                      </a:r>
+                    </a:p>
+                  </a:txBody>
+                  <a:tcPr marL="9525" marR="9525" marT="9525" marB="0" anchor="b"/>
+                </a:tc>
+                <a:tc>
+                  <a:txBody>
+                    <a:bodyPr/>
+                    <a:lstStyle/>
+                    <a:p>
+                      <a:pPr algn="r" fontAlgn="b"/>
+                      <a:r>
+                        <a:rPr lang="en-US" sz="1100" b="0" i="0" u="none" strike="noStrike">
+                          <a:solidFill>
+                            <a:srgbClr val="000000"/>
+                          </a:solidFill>
+                          <a:effectLst/>
+                          <a:latin typeface="Batang" panose="02030600000101010101" pitchFamily="18" charset="-127"/>
+                          <a:ea typeface="Batang" panose="02030600000101010101" pitchFamily="18" charset="-127"/>
+                        </a:rPr>
+                        <a:t>34495</a:t>
+                      </a:r>
+                    </a:p>
+                  </a:txBody>
+                  <a:tcPr marL="9525" marR="9525" marT="9525" marB="0" anchor="b"/>
+                </a:tc>
+                <a:tc>
+                  <a:txBody>
+                    <a:bodyPr/>
+                    <a:lstStyle/>
+                    <a:p>
+                      <a:pPr algn="r" fontAlgn="b"/>
+                      <a:r>
                         <a:rPr lang="en-US" sz="1100" b="0" i="0" u="none" strike="noStrike" dirty="0">
                           <a:solidFill>
                             <a:srgbClr val="000000"/>
@@ -15858,91 +15709,7 @@
                           <a:latin typeface="Batang" panose="02030600000101010101" pitchFamily="18" charset="-127"/>
                           <a:ea typeface="Batang" panose="02030600000101010101" pitchFamily="18" charset="-127"/>
                         </a:rPr>
-                        <a:t>TB</a:t>
-                      </a:r>
-                    </a:p>
-                  </a:txBody>
-                  <a:tcPr marL="9525" marR="9525" marT="9525" marB="0" anchor="b"/>
-                </a:tc>
-                <a:tc>
-                  <a:txBody>
-                    <a:bodyPr/>
-                    <a:lstStyle/>
-                    <a:p>
-                      <a:pPr algn="r" fontAlgn="b"/>
-                      <a:r>
-                        <a:rPr lang="en-US" sz="1100" b="0" i="0" u="none" strike="noStrike" dirty="0">
-                          <a:solidFill>
-                            <a:srgbClr val="000000"/>
-                          </a:solidFill>
-                          <a:effectLst/>
-                          <a:latin typeface="Batang" panose="02030600000101010101" pitchFamily="18" charset="-127"/>
-                          <a:ea typeface="Batang" panose="02030600000101010101" pitchFamily="18" charset="-127"/>
-                        </a:rPr>
-                        <a:t>TB</a:t>
-                      </a:r>
-                    </a:p>
-                  </a:txBody>
-                  <a:tcPr marL="9525" marR="9525" marT="9525" marB="0" anchor="b"/>
-                </a:tc>
-                <a:tc>
-                  <a:txBody>
-                    <a:bodyPr/>
-                    <a:lstStyle/>
-                    <a:p>
-                      <a:pPr algn="r" fontAlgn="b"/>
-                      <a:r>
-                        <a:rPr lang="en-US" sz="1100" b="0" i="0" u="none" strike="noStrike" dirty="0">
-                          <a:solidFill>
-                            <a:srgbClr val="000000"/>
-                          </a:solidFill>
-                          <a:effectLst/>
-                          <a:latin typeface="Batang" panose="02030600000101010101" pitchFamily="18" charset="-127"/>
-                          <a:ea typeface="Batang" panose="02030600000101010101" pitchFamily="18" charset="-127"/>
-                        </a:rPr>
-                        <a:t>217.05</a:t>
-                      </a:r>
-                    </a:p>
-                  </a:txBody>
-                  <a:tcPr marL="9525" marR="9525" marT="9525" marB="0" anchor="b"/>
-                </a:tc>
-                <a:tc>
-                  <a:txBody>
-                    <a:bodyPr/>
-                    <a:lstStyle/>
-                    <a:p>
-                      <a:pPr algn="r" fontAlgn="b"/>
-                      <a:r>
-                        <a:rPr lang="en-US" sz="1100" b="0" i="0" u="none" strike="noStrike" dirty="0">
-                          <a:solidFill>
-                            <a:srgbClr val="000000"/>
-                          </a:solidFill>
-                          <a:effectLst/>
-                          <a:latin typeface="Batang" panose="02030600000101010101" pitchFamily="18" charset="-127"/>
-                          <a:ea typeface="Batang" panose="02030600000101010101" pitchFamily="18" charset="-127"/>
-                        </a:rPr>
-                        <a:t>38368</a:t>
-                      </a:r>
-                    </a:p>
-                  </a:txBody>
-                  <a:tcPr marL="9525" marR="9525" marT="9525" marB="0" anchor="b"/>
-                </a:tc>
-                <a:tc>
-                  <a:txBody>
-                    <a:bodyPr/>
-                    <a:lstStyle/>
-                    <a:p>
-                      <a:pPr algn="r" fontAlgn="b"/>
-                      <a:r>
-                        <a:rPr lang="en-US" sz="1100" b="0" i="0" u="none" strike="noStrike" dirty="0">
-                          <a:solidFill>
-                            <a:srgbClr val="000000"/>
-                          </a:solidFill>
-                          <a:effectLst/>
-                          <a:latin typeface="Batang" panose="02030600000101010101" pitchFamily="18" charset="-127"/>
-                          <a:ea typeface="Batang" panose="02030600000101010101" pitchFamily="18" charset="-127"/>
-                        </a:rPr>
-                        <a:t>16.53%</a:t>
+                        <a:t>16.87%</a:t>
                       </a:r>
                     </a:p>
                   </a:txBody>
@@ -15965,7 +15732,7 @@
                           <a:latin typeface="Batang" panose="02030600000101010101" pitchFamily="18" charset="-127"/>
                           <a:ea typeface="Batang" panose="02030600000101010101" pitchFamily="18" charset="-127"/>
                         </a:rPr>
-                        <a:t>1400</a:t>
+                        <a:t>1200</a:t>
                       </a:r>
                       <a:endParaRPr lang="en-US" sz="1100" b="0" i="0" u="none" strike="noStrike" dirty="0">
                         <a:solidFill>
@@ -15985,6 +15752,247 @@
                     <a:lstStyle/>
                     <a:p>
                       <a:pPr algn="r" fontAlgn="b"/>
+                      <a:r>
+                        <a:rPr lang="en-US" sz="1100" b="0" i="0" u="none" strike="noStrike">
+                          <a:solidFill>
+                            <a:srgbClr val="000000"/>
+                          </a:solidFill>
+                          <a:effectLst/>
+                          <a:latin typeface="Batang" panose="02030600000101010101" pitchFamily="18" charset="-127"/>
+                          <a:ea typeface="Batang" panose="02030600000101010101" pitchFamily="18" charset="-127"/>
+                        </a:rPr>
+                        <a:t>631316</a:t>
+                      </a:r>
+                    </a:p>
+                  </a:txBody>
+                  <a:tcPr marL="9525" marR="9525" marT="9525" marB="0" anchor="b"/>
+                </a:tc>
+                <a:tc>
+                  <a:txBody>
+                    <a:bodyPr/>
+                    <a:lstStyle/>
+                    <a:p>
+                      <a:pPr algn="r" fontAlgn="b"/>
+                      <a:r>
+                        <a:rPr lang="en-US" sz="1100" b="0" i="0" u="none" strike="noStrike" dirty="0">
+                          <a:solidFill>
+                            <a:srgbClr val="000000"/>
+                          </a:solidFill>
+                          <a:effectLst/>
+                          <a:latin typeface="Batang" panose="02030600000101010101" pitchFamily="18" charset="-127"/>
+                          <a:ea typeface="Batang" panose="02030600000101010101" pitchFamily="18" charset="-127"/>
+                        </a:rPr>
+                        <a:t>0.42</a:t>
+                      </a:r>
+                    </a:p>
+                  </a:txBody>
+                  <a:tcPr marL="9525" marR="9525" marT="9525" marB="0" anchor="b"/>
+                </a:tc>
+                <a:tc>
+                  <a:txBody>
+                    <a:bodyPr/>
+                    <a:lstStyle/>
+                    <a:p>
+                      <a:pPr algn="r" fontAlgn="b"/>
+                      <a:r>
+                        <a:rPr lang="en-US" sz="1100" b="0" i="0" u="none" strike="noStrike" dirty="0">
+                          <a:solidFill>
+                            <a:srgbClr val="000000"/>
+                          </a:solidFill>
+                          <a:effectLst/>
+                          <a:latin typeface="Batang" panose="02030600000101010101" pitchFamily="18" charset="-127"/>
+                          <a:ea typeface="Batang" panose="02030600000101010101" pitchFamily="18" charset="-127"/>
+                        </a:rPr>
+                        <a:t>45964</a:t>
+                      </a:r>
+                    </a:p>
+                  </a:txBody>
+                  <a:tcPr marL="9525" marR="9525" marT="9525" marB="0" anchor="b"/>
+                </a:tc>
+                <a:tc>
+                  <a:txBody>
+                    <a:bodyPr/>
+                    <a:lstStyle/>
+                    <a:p>
+                      <a:pPr algn="r" fontAlgn="b"/>
+                      <a:r>
+                        <a:rPr lang="en-US" sz="1100" b="0" i="0" u="none" strike="noStrike" dirty="0">
+                          <a:solidFill>
+                            <a:srgbClr val="000000"/>
+                          </a:solidFill>
+                          <a:effectLst/>
+                          <a:latin typeface="Batang" panose="02030600000101010101" pitchFamily="18" charset="-127"/>
+                          <a:ea typeface="Batang" panose="02030600000101010101" pitchFamily="18" charset="-127"/>
+                        </a:rPr>
+                        <a:t>92.72%</a:t>
+                      </a:r>
+                    </a:p>
+                  </a:txBody>
+                  <a:tcPr marL="9525" marR="9525" marT="9525" marB="0" anchor="b"/>
+                </a:tc>
+                <a:tc>
+                  <a:txBody>
+                    <a:bodyPr/>
+                    <a:lstStyle/>
+                    <a:p>
+                      <a:pPr algn="r" fontAlgn="b"/>
+                      <a:r>
+                        <a:rPr lang="en-US" sz="1100" b="0" i="0" u="none" strike="noStrike" dirty="0">
+                          <a:solidFill>
+                            <a:srgbClr val="000000"/>
+                          </a:solidFill>
+                          <a:effectLst/>
+                          <a:latin typeface="Batang" panose="02030600000101010101" pitchFamily="18" charset="-127"/>
+                          <a:ea typeface="Batang" panose="02030600000101010101" pitchFamily="18" charset="-127"/>
+                        </a:rPr>
+                        <a:t>TB</a:t>
+                      </a:r>
+                    </a:p>
+                  </a:txBody>
+                  <a:tcPr marL="9525" marR="9525" marT="9525" marB="0" anchor="b"/>
+                </a:tc>
+                <a:tc>
+                  <a:txBody>
+                    <a:bodyPr/>
+                    <a:lstStyle/>
+                    <a:p>
+                      <a:pPr algn="r" fontAlgn="b"/>
+                      <a:r>
+                        <a:rPr lang="en-US" sz="1100" b="0" i="0" u="none" strike="noStrike" dirty="0">
+                          <a:solidFill>
+                            <a:srgbClr val="000000"/>
+                          </a:solidFill>
+                          <a:effectLst/>
+                          <a:latin typeface="Batang" panose="02030600000101010101" pitchFamily="18" charset="-127"/>
+                          <a:ea typeface="Batang" panose="02030600000101010101" pitchFamily="18" charset="-127"/>
+                        </a:rPr>
+                        <a:t>TB</a:t>
+                      </a:r>
+                    </a:p>
+                  </a:txBody>
+                  <a:tcPr marL="9525" marR="9525" marT="9525" marB="0" anchor="b"/>
+                </a:tc>
+                <a:tc>
+                  <a:txBody>
+                    <a:bodyPr/>
+                    <a:lstStyle/>
+                    <a:p>
+                      <a:pPr algn="r" fontAlgn="b"/>
+                      <a:r>
+                        <a:rPr lang="en-US" sz="1100" b="0" i="0" u="none" strike="noStrike" dirty="0">
+                          <a:solidFill>
+                            <a:srgbClr val="000000"/>
+                          </a:solidFill>
+                          <a:effectLst/>
+                          <a:latin typeface="Batang" panose="02030600000101010101" pitchFamily="18" charset="-127"/>
+                          <a:ea typeface="Batang" panose="02030600000101010101" pitchFamily="18" charset="-127"/>
+                        </a:rPr>
+                        <a:t>TB</a:t>
+                      </a:r>
+                    </a:p>
+                  </a:txBody>
+                  <a:tcPr marL="9525" marR="9525" marT="9525" marB="0" anchor="b"/>
+                </a:tc>
+                <a:tc>
+                  <a:txBody>
+                    <a:bodyPr/>
+                    <a:lstStyle/>
+                    <a:p>
+                      <a:pPr algn="r" fontAlgn="b"/>
+                      <a:r>
+                        <a:rPr lang="en-US" sz="1100" b="0" i="0" u="none" strike="noStrike" dirty="0">
+                          <a:solidFill>
+                            <a:srgbClr val="000000"/>
+                          </a:solidFill>
+                          <a:effectLst/>
+                          <a:latin typeface="Batang" panose="02030600000101010101" pitchFamily="18" charset="-127"/>
+                          <a:ea typeface="Batang" panose="02030600000101010101" pitchFamily="18" charset="-127"/>
+                        </a:rPr>
+                        <a:t>217.05</a:t>
+                      </a:r>
+                    </a:p>
+                  </a:txBody>
+                  <a:tcPr marL="9525" marR="9525" marT="9525" marB="0" anchor="b"/>
+                </a:tc>
+                <a:tc>
+                  <a:txBody>
+                    <a:bodyPr/>
+                    <a:lstStyle/>
+                    <a:p>
+                      <a:pPr algn="r" fontAlgn="b"/>
+                      <a:r>
+                        <a:rPr lang="en-US" sz="1100" b="0" i="0" u="none" strike="noStrike" dirty="0">
+                          <a:solidFill>
+                            <a:srgbClr val="000000"/>
+                          </a:solidFill>
+                          <a:effectLst/>
+                          <a:latin typeface="Batang" panose="02030600000101010101" pitchFamily="18" charset="-127"/>
+                          <a:ea typeface="Batang" panose="02030600000101010101" pitchFamily="18" charset="-127"/>
+                        </a:rPr>
+                        <a:t>38368</a:t>
+                      </a:r>
+                    </a:p>
+                  </a:txBody>
+                  <a:tcPr marL="9525" marR="9525" marT="9525" marB="0" anchor="b"/>
+                </a:tc>
+                <a:tc>
+                  <a:txBody>
+                    <a:bodyPr/>
+                    <a:lstStyle/>
+                    <a:p>
+                      <a:pPr algn="r" fontAlgn="b"/>
+                      <a:r>
+                        <a:rPr lang="en-US" sz="1100" b="0" i="0" u="none" strike="noStrike" dirty="0">
+                          <a:solidFill>
+                            <a:srgbClr val="000000"/>
+                          </a:solidFill>
+                          <a:effectLst/>
+                          <a:latin typeface="Batang" panose="02030600000101010101" pitchFamily="18" charset="-127"/>
+                          <a:ea typeface="Batang" panose="02030600000101010101" pitchFamily="18" charset="-127"/>
+                        </a:rPr>
+                        <a:t>16.53%</a:t>
+                      </a:r>
+                    </a:p>
+                  </a:txBody>
+                  <a:tcPr marL="9525" marR="9525" marT="9525" marB="0" anchor="b"/>
+                </a:tc>
+              </a:tr>
+              <a:tr h="370840">
+                <a:tc>
+                  <a:txBody>
+                    <a:bodyPr/>
+                    <a:lstStyle/>
+                    <a:p>
+                      <a:pPr algn="r" fontAlgn="b"/>
+                      <a:r>
+                        <a:rPr lang="en-US" sz="1100" b="0" i="0" u="none" strike="noStrike" dirty="0" smtClean="0">
+                          <a:solidFill>
+                            <a:srgbClr val="000000"/>
+                          </a:solidFill>
+                          <a:effectLst/>
+                          <a:latin typeface="Batang" panose="02030600000101010101" pitchFamily="18" charset="-127"/>
+                          <a:ea typeface="Batang" panose="02030600000101010101" pitchFamily="18" charset="-127"/>
+                        </a:rPr>
+                        <a:t>1400</a:t>
+                      </a:r>
+                      <a:endParaRPr lang="en-US" sz="1100" b="0" i="0" u="none" strike="noStrike" dirty="0">
+                        <a:solidFill>
+                          <a:srgbClr val="000000"/>
+                        </a:solidFill>
+                        <a:effectLst/>
+                        <a:latin typeface="Batang" panose="02030600000101010101" pitchFamily="18" charset="-127"/>
+                        <a:ea typeface="Batang" panose="02030600000101010101" pitchFamily="18" charset="-127"/>
+                      </a:endParaRPr>
+                    </a:p>
+                  </a:txBody>
+                  <a:tcPr marL="9525" marR="9525" marT="9525" marB="0" anchor="b"/>
+                </a:tc>
+                <a:tc>
+                  <a:txBody>
+                    <a:bodyPr/>
+                    <a:lstStyle/>
+                    <a:p>
+                      <a:pPr algn="r" fontAlgn="b"/>
                       <a:endParaRPr lang="en-US" sz="1100" b="0" i="0" u="none" strike="noStrike">
                         <a:solidFill>
                           <a:srgbClr val="000000"/>
@@ -16196,176 +16204,206 @@
                     <a:lstStyle/>
                     <a:p>
                       <a:pPr algn="r" fontAlgn="b"/>
-                      <a:endParaRPr lang="en-US" sz="1100" b="0" i="0" u="none" strike="noStrike">
-                        <a:solidFill>
-                          <a:srgbClr val="000000"/>
-                        </a:solidFill>
-                        <a:effectLst/>
-                        <a:latin typeface="Batang" panose="02030600000101010101" pitchFamily="18" charset="-127"/>
-                        <a:ea typeface="Batang" panose="02030600000101010101" pitchFamily="18" charset="-127"/>
-                      </a:endParaRPr>
-                    </a:p>
-                  </a:txBody>
-                  <a:tcPr marL="9525" marR="9525" marT="9525" marB="0" anchor="b"/>
-                </a:tc>
-                <a:tc>
-                  <a:txBody>
-                    <a:bodyPr/>
-                    <a:lstStyle/>
-                    <a:p>
-                      <a:pPr algn="r" fontAlgn="b"/>
-                      <a:endParaRPr lang="en-US" sz="1100" b="0" i="0" u="none" strike="noStrike">
-                        <a:solidFill>
-                          <a:srgbClr val="000000"/>
-                        </a:solidFill>
-                        <a:effectLst/>
-                        <a:latin typeface="Batang" panose="02030600000101010101" pitchFamily="18" charset="-127"/>
-                        <a:ea typeface="Batang" panose="02030600000101010101" pitchFamily="18" charset="-127"/>
-                      </a:endParaRPr>
-                    </a:p>
-                  </a:txBody>
-                  <a:tcPr marL="9525" marR="9525" marT="9525" marB="0" anchor="b"/>
-                </a:tc>
-                <a:tc>
-                  <a:txBody>
-                    <a:bodyPr/>
-                    <a:lstStyle/>
-                    <a:p>
-                      <a:pPr algn="r" fontAlgn="b"/>
-                      <a:endParaRPr lang="en-US" sz="1100" b="0" i="0" u="none" strike="noStrike">
-                        <a:solidFill>
-                          <a:srgbClr val="000000"/>
-                        </a:solidFill>
-                        <a:effectLst/>
-                        <a:latin typeface="Batang" panose="02030600000101010101" pitchFamily="18" charset="-127"/>
-                        <a:ea typeface="Batang" panose="02030600000101010101" pitchFamily="18" charset="-127"/>
-                      </a:endParaRPr>
-                    </a:p>
-                  </a:txBody>
-                  <a:tcPr marL="9525" marR="9525" marT="9525" marB="0" anchor="b"/>
-                </a:tc>
-                <a:tc>
-                  <a:txBody>
-                    <a:bodyPr/>
-                    <a:lstStyle/>
-                    <a:p>
-                      <a:pPr algn="r" fontAlgn="b"/>
-                      <a:endParaRPr lang="en-US" sz="1100" b="0" i="0" u="none" strike="noStrike" dirty="0">
-                        <a:solidFill>
-                          <a:srgbClr val="000000"/>
-                        </a:solidFill>
-                        <a:effectLst/>
-                        <a:latin typeface="Batang" panose="02030600000101010101" pitchFamily="18" charset="-127"/>
-                        <a:ea typeface="Batang" panose="02030600000101010101" pitchFamily="18" charset="-127"/>
-                      </a:endParaRPr>
-                    </a:p>
-                  </a:txBody>
-                  <a:tcPr marL="9525" marR="9525" marT="9525" marB="0" anchor="b"/>
-                </a:tc>
-                <a:tc>
-                  <a:txBody>
-                    <a:bodyPr/>
-                    <a:lstStyle/>
-                    <a:p>
-                      <a:pPr algn="r" fontAlgn="b"/>
-                      <a:endParaRPr lang="en-US" sz="1100" b="0" i="0" u="none" strike="noStrike" dirty="0">
-                        <a:solidFill>
-                          <a:srgbClr val="000000"/>
-                        </a:solidFill>
-                        <a:effectLst/>
-                        <a:latin typeface="Batang" panose="02030600000101010101" pitchFamily="18" charset="-127"/>
-                        <a:ea typeface="Batang" panose="02030600000101010101" pitchFamily="18" charset="-127"/>
-                      </a:endParaRPr>
-                    </a:p>
-                  </a:txBody>
-                  <a:tcPr marL="9525" marR="9525" marT="9525" marB="0" anchor="b"/>
-                </a:tc>
-                <a:tc>
-                  <a:txBody>
-                    <a:bodyPr/>
-                    <a:lstStyle/>
-                    <a:p>
-                      <a:pPr algn="r" fontAlgn="b"/>
-                      <a:endParaRPr lang="en-US" sz="1100" b="0" i="0" u="none" strike="noStrike" dirty="0">
-                        <a:solidFill>
-                          <a:srgbClr val="000000"/>
-                        </a:solidFill>
-                        <a:effectLst/>
-                        <a:latin typeface="Batang" panose="02030600000101010101" pitchFamily="18" charset="-127"/>
-                        <a:ea typeface="Batang" panose="02030600000101010101" pitchFamily="18" charset="-127"/>
-                      </a:endParaRPr>
-                    </a:p>
-                  </a:txBody>
-                  <a:tcPr marL="9525" marR="9525" marT="9525" marB="0" anchor="b"/>
-                </a:tc>
-                <a:tc>
-                  <a:txBody>
-                    <a:bodyPr/>
-                    <a:lstStyle/>
-                    <a:p>
-                      <a:pPr algn="r" fontAlgn="b"/>
-                      <a:endParaRPr lang="en-US" sz="1100" b="0" i="0" u="none" strike="noStrike" dirty="0">
-                        <a:solidFill>
-                          <a:srgbClr val="000000"/>
-                        </a:solidFill>
-                        <a:effectLst/>
-                        <a:latin typeface="Batang" panose="02030600000101010101" pitchFamily="18" charset="-127"/>
-                        <a:ea typeface="Batang" panose="02030600000101010101" pitchFamily="18" charset="-127"/>
-                      </a:endParaRPr>
-                    </a:p>
-                  </a:txBody>
-                  <a:tcPr marL="9525" marR="9525" marT="9525" marB="0" anchor="b"/>
-                </a:tc>
-                <a:tc>
-                  <a:txBody>
-                    <a:bodyPr/>
-                    <a:lstStyle/>
-                    <a:p>
-                      <a:pPr algn="r" fontAlgn="b"/>
-                      <a:endParaRPr lang="en-US" sz="1100" b="0" i="0" u="none" strike="noStrike" dirty="0">
-                        <a:solidFill>
-                          <a:srgbClr val="000000"/>
-                        </a:solidFill>
-                        <a:effectLst/>
-                        <a:latin typeface="Batang" panose="02030600000101010101" pitchFamily="18" charset="-127"/>
-                        <a:ea typeface="Batang" panose="02030600000101010101" pitchFamily="18" charset="-127"/>
-                      </a:endParaRPr>
-                    </a:p>
-                  </a:txBody>
-                  <a:tcPr marL="9525" marR="9525" marT="9525" marB="0" anchor="b"/>
-                </a:tc>
-                <a:tc>
-                  <a:txBody>
-                    <a:bodyPr/>
-                    <a:lstStyle/>
-                    <a:p>
-                      <a:pPr algn="r" fontAlgn="b"/>
-                      <a:endParaRPr lang="en-US" sz="1100" b="0" i="0" u="none" strike="noStrike" dirty="0">
-                        <a:solidFill>
-                          <a:srgbClr val="000000"/>
-                        </a:solidFill>
-                        <a:effectLst/>
-                        <a:latin typeface="Batang" panose="02030600000101010101" pitchFamily="18" charset="-127"/>
-                        <a:ea typeface="Batang" panose="02030600000101010101" pitchFamily="18" charset="-127"/>
-                      </a:endParaRPr>
-                    </a:p>
-                  </a:txBody>
-                  <a:tcPr marL="9525" marR="9525" marT="9525" marB="0" anchor="b"/>
-                </a:tc>
-                <a:tc>
-                  <a:txBody>
-                    <a:bodyPr/>
-                    <a:lstStyle/>
-                    <a:p>
-                      <a:pPr algn="r" fontAlgn="b"/>
-                      <a:endParaRPr lang="en-US" sz="1100" b="0" i="0" u="none" strike="noStrike" dirty="0">
-                        <a:solidFill>
-                          <a:srgbClr val="000000"/>
-                        </a:solidFill>
-                        <a:effectLst/>
-                        <a:latin typeface="Batang" panose="02030600000101010101" pitchFamily="18" charset="-127"/>
-                        <a:ea typeface="Batang" panose="02030600000101010101" pitchFamily="18" charset="-127"/>
-                      </a:endParaRPr>
+                      <a:r>
+                        <a:rPr lang="en-US" sz="1100" b="0" i="0" u="none" strike="noStrike">
+                          <a:solidFill>
+                            <a:srgbClr val="000000"/>
+                          </a:solidFill>
+                          <a:effectLst/>
+                          <a:latin typeface="Batang" panose="02030600000101010101" pitchFamily="18" charset="-127"/>
+                          <a:ea typeface="Batang" panose="02030600000101010101" pitchFamily="18" charset="-127"/>
+                        </a:rPr>
+                        <a:t>838218</a:t>
+                      </a:r>
+                    </a:p>
+                  </a:txBody>
+                  <a:tcPr marL="9525" marR="9525" marT="9525" marB="0" anchor="b"/>
+                </a:tc>
+                <a:tc>
+                  <a:txBody>
+                    <a:bodyPr/>
+                    <a:lstStyle/>
+                    <a:p>
+                      <a:pPr algn="r" fontAlgn="b"/>
+                      <a:r>
+                        <a:rPr lang="en-US" sz="1100" b="0" i="0" u="none" strike="noStrike">
+                          <a:solidFill>
+                            <a:srgbClr val="000000"/>
+                          </a:solidFill>
+                          <a:effectLst/>
+                          <a:latin typeface="Batang" panose="02030600000101010101" pitchFamily="18" charset="-127"/>
+                          <a:ea typeface="Batang" panose="02030600000101010101" pitchFamily="18" charset="-127"/>
+                        </a:rPr>
+                        <a:t>0.73</a:t>
+                      </a:r>
+                    </a:p>
+                  </a:txBody>
+                  <a:tcPr marL="9525" marR="9525" marT="9525" marB="0" anchor="b"/>
+                </a:tc>
+                <a:tc>
+                  <a:txBody>
+                    <a:bodyPr/>
+                    <a:lstStyle/>
+                    <a:p>
+                      <a:pPr algn="r" fontAlgn="b"/>
+                      <a:r>
+                        <a:rPr lang="en-US" sz="1100" b="0" i="0" u="none" strike="noStrike">
+                          <a:solidFill>
+                            <a:srgbClr val="000000"/>
+                          </a:solidFill>
+                          <a:effectLst/>
+                          <a:latin typeface="Batang" panose="02030600000101010101" pitchFamily="18" charset="-127"/>
+                          <a:ea typeface="Batang" panose="02030600000101010101" pitchFamily="18" charset="-127"/>
+                        </a:rPr>
+                        <a:t>55192</a:t>
+                      </a:r>
+                    </a:p>
+                  </a:txBody>
+                  <a:tcPr marL="9525" marR="9525" marT="9525" marB="0" anchor="b"/>
+                </a:tc>
+                <a:tc>
+                  <a:txBody>
+                    <a:bodyPr/>
+                    <a:lstStyle/>
+                    <a:p>
+                      <a:pPr algn="r" fontAlgn="b"/>
+                      <a:r>
+                        <a:rPr lang="en-US" sz="1100" b="0" i="0" u="none" strike="noStrike">
+                          <a:solidFill>
+                            <a:srgbClr val="000000"/>
+                          </a:solidFill>
+                          <a:effectLst/>
+                          <a:latin typeface="Batang" panose="02030600000101010101" pitchFamily="18" charset="-127"/>
+                          <a:ea typeface="Batang" panose="02030600000101010101" pitchFamily="18" charset="-127"/>
+                        </a:rPr>
+                        <a:t>93.42%</a:t>
+                      </a:r>
+                    </a:p>
+                  </a:txBody>
+                  <a:tcPr marL="9525" marR="9525" marT="9525" marB="0" anchor="b"/>
+                </a:tc>
+                <a:tc>
+                  <a:txBody>
+                    <a:bodyPr/>
+                    <a:lstStyle/>
+                    <a:p>
+                      <a:pPr algn="r" fontAlgn="b"/>
+                      <a:r>
+                        <a:rPr lang="en-US" sz="1100" b="0" i="0" u="none" strike="noStrike">
+                          <a:solidFill>
+                            <a:srgbClr val="000000"/>
+                          </a:solidFill>
+                          <a:effectLst/>
+                          <a:latin typeface="Batang" panose="02030600000101010101" pitchFamily="18" charset="-127"/>
+                          <a:ea typeface="Batang" panose="02030600000101010101" pitchFamily="18" charset="-127"/>
+                        </a:rPr>
+                        <a:t>TB</a:t>
+                      </a:r>
+                    </a:p>
+                  </a:txBody>
+                  <a:tcPr marL="9525" marR="9525" marT="9525" marB="0" anchor="b"/>
+                </a:tc>
+                <a:tc>
+                  <a:txBody>
+                    <a:bodyPr/>
+                    <a:lstStyle/>
+                    <a:p>
+                      <a:pPr algn="r" fontAlgn="b"/>
+                      <a:r>
+                        <a:rPr lang="en-US" sz="1100" b="0" i="0" u="none" strike="noStrike">
+                          <a:solidFill>
+                            <a:srgbClr val="000000"/>
+                          </a:solidFill>
+                          <a:effectLst/>
+                          <a:latin typeface="Batang" panose="02030600000101010101" pitchFamily="18" charset="-127"/>
+                          <a:ea typeface="Batang" panose="02030600000101010101" pitchFamily="18" charset="-127"/>
+                        </a:rPr>
+                        <a:t>TB</a:t>
+                      </a:r>
+                    </a:p>
+                  </a:txBody>
+                  <a:tcPr marL="9525" marR="9525" marT="9525" marB="0" anchor="b"/>
+                </a:tc>
+                <a:tc>
+                  <a:txBody>
+                    <a:bodyPr/>
+                    <a:lstStyle/>
+                    <a:p>
+                      <a:pPr algn="r" fontAlgn="b"/>
+                      <a:r>
+                        <a:rPr lang="en-US" sz="1100" b="0" i="0" u="none" strike="noStrike">
+                          <a:solidFill>
+                            <a:srgbClr val="000000"/>
+                          </a:solidFill>
+                          <a:effectLst/>
+                          <a:latin typeface="Batang" panose="02030600000101010101" pitchFamily="18" charset="-127"/>
+                          <a:ea typeface="Batang" panose="02030600000101010101" pitchFamily="18" charset="-127"/>
+                        </a:rPr>
+                        <a:t>TB</a:t>
+                      </a:r>
+                    </a:p>
+                  </a:txBody>
+                  <a:tcPr marL="9525" marR="9525" marT="9525" marB="0" anchor="b"/>
+                </a:tc>
+                <a:tc>
+                  <a:txBody>
+                    <a:bodyPr/>
+                    <a:lstStyle/>
+                    <a:p>
+                      <a:pPr algn="r" fontAlgn="b"/>
+                      <a:r>
+                        <a:rPr lang="en-US" sz="1100" b="0" i="0" u="none" strike="noStrike">
+                          <a:solidFill>
+                            <a:srgbClr val="000000"/>
+                          </a:solidFill>
+                          <a:effectLst/>
+                          <a:latin typeface="Batang" panose="02030600000101010101" pitchFamily="18" charset="-127"/>
+                          <a:ea typeface="Batang" panose="02030600000101010101" pitchFamily="18" charset="-127"/>
+                        </a:rPr>
+                        <a:t>254.98</a:t>
+                      </a:r>
+                    </a:p>
+                  </a:txBody>
+                  <a:tcPr marL="9525" marR="9525" marT="9525" marB="0" anchor="b"/>
+                </a:tc>
+                <a:tc>
+                  <a:txBody>
+                    <a:bodyPr/>
+                    <a:lstStyle/>
+                    <a:p>
+                      <a:pPr algn="r" fontAlgn="b"/>
+                      <a:r>
+                        <a:rPr lang="en-US" sz="1100" b="0" i="0" u="none" strike="noStrike">
+                          <a:solidFill>
+                            <a:srgbClr val="000000"/>
+                          </a:solidFill>
+                          <a:effectLst/>
+                          <a:latin typeface="Batang" panose="02030600000101010101" pitchFamily="18" charset="-127"/>
+                          <a:ea typeface="Batang" panose="02030600000101010101" pitchFamily="18" charset="-127"/>
+                        </a:rPr>
+                        <a:t>46488</a:t>
+                      </a:r>
+                    </a:p>
+                  </a:txBody>
+                  <a:tcPr marL="9525" marR="9525" marT="9525" marB="0" anchor="b"/>
+                </a:tc>
+                <a:tc>
+                  <a:txBody>
+                    <a:bodyPr/>
+                    <a:lstStyle/>
+                    <a:p>
+                      <a:pPr algn="r" fontAlgn="b"/>
+                      <a:r>
+                        <a:rPr lang="en-US" sz="1100" b="0" i="0" u="none" strike="noStrike" dirty="0">
+                          <a:solidFill>
+                            <a:srgbClr val="000000"/>
+                          </a:solidFill>
+                          <a:effectLst/>
+                          <a:latin typeface="Batang" panose="02030600000101010101" pitchFamily="18" charset="-127"/>
+                          <a:ea typeface="Batang" panose="02030600000101010101" pitchFamily="18" charset="-127"/>
+                        </a:rPr>
+                        <a:t>15.77%</a:t>
+                      </a:r>
                     </a:p>
                   </a:txBody>
                   <a:tcPr marL="9525" marR="9525" marT="9525" marB="0" anchor="b"/>

</xml_diff>